<commit_message>
Updates both resume review training presentations with slides on bias. [Fixes #102]
</commit_message>
<xml_diff>
--- a/toolkit/reviewing-resumes/sme-training-resume-review.pptx
+++ b/toolkit/reviewing-resumes/sme-training-resume-review.pptx
@@ -5,10 +5,10 @@
     <p:sldMasterId id="2147483666" r:id="rId1"/>
   </p:sldMasterIdLst>
   <p:notesMasterIdLst>
-    <p:notesMasterId r:id="rId23"/>
+    <p:notesMasterId r:id="rId32"/>
   </p:notesMasterIdLst>
   <p:handoutMasterIdLst>
-    <p:handoutMasterId r:id="rId24"/>
+    <p:handoutMasterId r:id="rId33"/>
   </p:handoutMasterIdLst>
   <p:sldIdLst>
     <p:sldId id="256" r:id="rId2"/>
@@ -28,39 +28,67 @@
     <p:sldId id="341" r:id="rId16"/>
     <p:sldId id="342" r:id="rId17"/>
     <p:sldId id="298" r:id="rId18"/>
-    <p:sldId id="343" r:id="rId19"/>
-    <p:sldId id="290" r:id="rId20"/>
-    <p:sldId id="287" r:id="rId21"/>
-    <p:sldId id="291" r:id="rId22"/>
+    <p:sldId id="345" r:id="rId19"/>
+    <p:sldId id="346" r:id="rId20"/>
+    <p:sldId id="347" r:id="rId21"/>
+    <p:sldId id="348" r:id="rId22"/>
+    <p:sldId id="349" r:id="rId23"/>
+    <p:sldId id="350" r:id="rId24"/>
+    <p:sldId id="351" r:id="rId25"/>
+    <p:sldId id="353" r:id="rId26"/>
+    <p:sldId id="354" r:id="rId27"/>
+    <p:sldId id="355" r:id="rId28"/>
+    <p:sldId id="290" r:id="rId29"/>
+    <p:sldId id="287" r:id="rId30"/>
+    <p:sldId id="291" r:id="rId31"/>
   </p:sldIdLst>
   <p:sldSz cx="17340263" cy="9753600"/>
   <p:notesSz cx="6881813" cy="9296400"/>
   <p:embeddedFontLst>
     <p:embeddedFont>
-      <p:font typeface="Avenir" panose="02000503020000020003" pitchFamily="2" charset="0"/>
-      <p:regular r:id="rId25"/>
-      <p:italic r:id="rId26"/>
+      <p:font typeface="Cambria" panose="02040503050406030204" pitchFamily="18" charset="0"/>
+      <p:regular r:id="rId34"/>
+      <p:bold r:id="rId35"/>
+      <p:italic r:id="rId36"/>
+      <p:boldItalic r:id="rId37"/>
     </p:embeddedFont>
     <p:embeddedFont>
-      <p:font typeface="Merriweather Sans" pitchFamily="2" charset="77"/>
-      <p:regular r:id="rId27"/>
-      <p:bold r:id="rId28"/>
-      <p:italic r:id="rId29"/>
-      <p:boldItalic r:id="rId30"/>
-    </p:embeddedFont>
-    <p:embeddedFont>
-      <p:font typeface="Rockwell" panose="02060603020205020403" pitchFamily="18" charset="77"/>
-      <p:regular r:id="rId31"/>
-      <p:bold r:id="rId32"/>
-      <p:italic r:id="rId33"/>
-      <p:boldItalic r:id="rId34"/>
+      <p:font typeface="Rockwell" panose="02060603020205020403" pitchFamily="18" charset="0"/>
+      <p:regular r:id="rId38"/>
+      <p:bold r:id="rId39"/>
+      <p:italic r:id="rId40"/>
+      <p:boldItalic r:id="rId41"/>
     </p:embeddedFont>
     <p:embeddedFont>
       <p:font typeface="Source Sans Pro" panose="020B0503030403020204" pitchFamily="34" charset="0"/>
-      <p:regular r:id="rId35"/>
-      <p:bold r:id="rId36"/>
-      <p:italic r:id="rId37"/>
-      <p:boldItalic r:id="rId38"/>
+      <p:regular r:id="rId42"/>
+      <p:bold r:id="rId43"/>
+      <p:italic r:id="rId44"/>
+      <p:boldItalic r:id="rId45"/>
+    </p:embeddedFont>
+    <p:embeddedFont>
+      <p:font typeface="Merriweather" panose="00000500000000000000" pitchFamily="2" charset="0"/>
+      <p:regular r:id="rId46"/>
+      <p:bold r:id="rId47"/>
+      <p:italic r:id="rId48"/>
+      <p:boldItalic r:id="rId49"/>
+    </p:embeddedFont>
+    <p:embeddedFont>
+      <p:font typeface="Source Sans Pro SemiBold" panose="020B0603030403020204" pitchFamily="34" charset="0"/>
+      <p:bold r:id="rId50"/>
+      <p:boldItalic r:id="rId51"/>
+    </p:embeddedFont>
+    <p:embeddedFont>
+      <p:font typeface="Merriweather Sans"/>
+      <p:regular r:id="rId52"/>
+      <p:bold r:id="rId53"/>
+      <p:italic r:id="rId54"/>
+      <p:boldItalic r:id="rId55"/>
+    </p:embeddedFont>
+    <p:embeddedFont>
+      <p:font typeface="Avenir"/>
+      <p:regular r:id="rId56"/>
+      <p:italic r:id="rId57"/>
     </p:embeddedFont>
   </p:embeddedFontLst>
   <p:defaultTextStyle>
@@ -420,7 +448,7 @@
           <a:p>
             <a:fld id="{5F1244B9-655E-9143-8F11-143B7EBD7CDE}" type="datetimeFigureOut">
               <a:rPr lang="en-US" smtClean="0"/>
-              <a:t>8/15/19</a:t>
+              <a:t>11/20/2019</a:t>
             </a:fld>
             <a:endParaRPr lang="en-US"/>
           </a:p>
@@ -1738,11 +1766,11 @@
 </file>
 
 <file path=ppt/notesSlides/notesSlide16.xml><?xml version="1.0" encoding="utf-8"?>
-<p:notes xmlns:a="http://schemas.openxmlformats.org/drawingml/2006/main" xmlns:r="http://schemas.openxmlformats.org/officeDocument/2006/relationships" xmlns:p="http://schemas.openxmlformats.org/presentationml/2006/main">
+<p:notes xmlns:a="http://schemas.openxmlformats.org/drawingml/2006/main" xmlns:r="http://schemas.openxmlformats.org/officeDocument/2006/relationships" xmlns:p="http://schemas.openxmlformats.org/presentationml/2006/main" showMasterSp="0" showMasterPhAnim="0">
   <p:cSld>
     <p:spTree>
       <p:nvGrpSpPr>
-        <p:cNvPr id="1" name=""/>
+        <p:cNvPr id="1" name="Shape 378"/>
         <p:cNvGrpSpPr/>
         <p:nvPr/>
       </p:nvGrpSpPr>
@@ -1756,42 +1784,87 @@
       </p:grpSpPr>
       <p:sp>
         <p:nvSpPr>
-          <p:cNvPr id="2" name="Slide Image Placeholder 1"/>
+          <p:cNvPr id="379" name="Google Shape;379;g5ffbf5f0a7_1_316:notes"/>
           <p:cNvSpPr>
             <a:spLocks noGrp="1" noRot="1" noChangeAspect="1"/>
           </p:cNvSpPr>
           <p:nvPr>
-            <p:ph type="sldImg"/>
+            <p:ph type="sldImg" idx="2"/>
           </p:nvPr>
         </p:nvSpPr>
-        <p:spPr/>
+        <p:spPr>
+          <a:xfrm>
+            <a:off x="342900" y="696913"/>
+            <a:ext cx="6196013" cy="3486150"/>
+          </a:xfrm>
+          <a:custGeom>
+            <a:avLst/>
+            <a:gdLst/>
+            <a:ahLst/>
+            <a:cxnLst/>
+            <a:rect l="l" t="t" r="r" b="b"/>
+            <a:pathLst>
+              <a:path w="120000" h="120000" extrusionOk="0">
+                <a:moveTo>
+                  <a:pt x="0" y="0"/>
+                </a:moveTo>
+                <a:lnTo>
+                  <a:pt x="120000" y="0"/>
+                </a:lnTo>
+                <a:lnTo>
+                  <a:pt x="120000" y="120000"/>
+                </a:lnTo>
+                <a:lnTo>
+                  <a:pt x="0" y="120000"/>
+                </a:lnTo>
+                <a:close/>
+              </a:path>
+            </a:pathLst>
+          </a:custGeom>
+        </p:spPr>
       </p:sp>
       <p:sp>
         <p:nvSpPr>
-          <p:cNvPr id="3" name="Notes Placeholder 2"/>
-          <p:cNvSpPr>
+          <p:cNvPr id="380" name="Google Shape;380;g5ffbf5f0a7_1_316:notes"/>
+          <p:cNvSpPr txBox="1">
             <a:spLocks noGrp="1"/>
           </p:cNvSpPr>
           <p:nvPr>
             <p:ph type="body" idx="1"/>
           </p:nvPr>
         </p:nvSpPr>
-        <p:spPr/>
+        <p:spPr>
+          <a:xfrm>
+            <a:off x="688180" y="4415790"/>
+            <a:ext cx="5505300" cy="4183500"/>
+          </a:xfrm>
+          <a:prstGeom prst="rect">
+            <a:avLst/>
+          </a:prstGeom>
+        </p:spPr>
         <p:txBody>
-          <a:bodyPr/>
+          <a:bodyPr spcFirstLastPara="1" wrap="square" lIns="92425" tIns="46200" rIns="92425" bIns="46200" anchor="t" anchorCtr="0">
+            <a:noAutofit/>
+          </a:bodyPr>
           <a:lstStyle/>
           <a:p>
-            <a:r>
-              <a:rPr lang="en-US" dirty="0"/>
-              <a:t>NOTES TBD</a:t>
-            </a:r>
+            <a:pPr marL="0" lvl="0" indent="0" algn="l" rtl="0">
+              <a:spcBef>
+                <a:spcPts val="0"/>
+              </a:spcBef>
+              <a:spcAft>
+                <a:spcPts val="0"/>
+              </a:spcAft>
+              <a:buNone/>
+            </a:pPr>
+            <a:endParaRPr/>
           </a:p>
         </p:txBody>
       </p:sp>
     </p:spTree>
     <p:extLst>
       <p:ext uri="{BB962C8B-B14F-4D97-AF65-F5344CB8AC3E}">
-        <p14:creationId xmlns:p14="http://schemas.microsoft.com/office/powerpoint/2010/main" val="4117746185"/>
+        <p14:creationId xmlns:p14="http://schemas.microsoft.com/office/powerpoint/2010/main" val="1033522172"/>
       </p:ext>
     </p:extLst>
   </p:cSld>
@@ -1802,6 +1875,1103 @@
 </file>
 
 <file path=ppt/notesSlides/notesSlide17.xml><?xml version="1.0" encoding="utf-8"?>
+<p:notes xmlns:a="http://schemas.openxmlformats.org/drawingml/2006/main" xmlns:r="http://schemas.openxmlformats.org/officeDocument/2006/relationships" xmlns:p="http://schemas.openxmlformats.org/presentationml/2006/main" showMasterSp="0" showMasterPhAnim="0">
+  <p:cSld>
+    <p:spTree>
+      <p:nvGrpSpPr>
+        <p:cNvPr id="1" name="Shape 385"/>
+        <p:cNvGrpSpPr/>
+        <p:nvPr/>
+      </p:nvGrpSpPr>
+      <p:grpSpPr>
+        <a:xfrm>
+          <a:off x="0" y="0"/>
+          <a:ext cx="0" cy="0"/>
+          <a:chOff x="0" y="0"/>
+          <a:chExt cx="0" cy="0"/>
+        </a:xfrm>
+      </p:grpSpPr>
+      <p:sp>
+        <p:nvSpPr>
+          <p:cNvPr id="386" name="Google Shape;386;g5ffbf5f0a7_1_55:notes"/>
+          <p:cNvSpPr>
+            <a:spLocks noGrp="1" noRot="1" noChangeAspect="1"/>
+          </p:cNvSpPr>
+          <p:nvPr>
+            <p:ph type="sldImg" idx="2"/>
+          </p:nvPr>
+        </p:nvSpPr>
+        <p:spPr>
+          <a:xfrm>
+            <a:off x="342900" y="696913"/>
+            <a:ext cx="6196013" cy="3486150"/>
+          </a:xfrm>
+          <a:custGeom>
+            <a:avLst/>
+            <a:gdLst/>
+            <a:ahLst/>
+            <a:cxnLst/>
+            <a:rect l="l" t="t" r="r" b="b"/>
+            <a:pathLst>
+              <a:path w="120000" h="120000" extrusionOk="0">
+                <a:moveTo>
+                  <a:pt x="0" y="0"/>
+                </a:moveTo>
+                <a:lnTo>
+                  <a:pt x="120000" y="0"/>
+                </a:lnTo>
+                <a:lnTo>
+                  <a:pt x="120000" y="120000"/>
+                </a:lnTo>
+                <a:lnTo>
+                  <a:pt x="0" y="120000"/>
+                </a:lnTo>
+                <a:close/>
+              </a:path>
+            </a:pathLst>
+          </a:custGeom>
+        </p:spPr>
+      </p:sp>
+      <p:sp>
+        <p:nvSpPr>
+          <p:cNvPr id="387" name="Google Shape;387;g5ffbf5f0a7_1_55:notes"/>
+          <p:cNvSpPr txBox="1">
+            <a:spLocks noGrp="1"/>
+          </p:cNvSpPr>
+          <p:nvPr>
+            <p:ph type="body" idx="1"/>
+          </p:nvPr>
+        </p:nvSpPr>
+        <p:spPr>
+          <a:xfrm>
+            <a:off x="688180" y="4415790"/>
+            <a:ext cx="5505300" cy="4183500"/>
+          </a:xfrm>
+          <a:prstGeom prst="rect">
+            <a:avLst/>
+          </a:prstGeom>
+        </p:spPr>
+        <p:txBody>
+          <a:bodyPr spcFirstLastPara="1" wrap="square" lIns="92425" tIns="46200" rIns="92425" bIns="46200" anchor="t" anchorCtr="0">
+            <a:noAutofit/>
+          </a:bodyPr>
+          <a:lstStyle/>
+          <a:p>
+            <a:pPr marL="0" lvl="0" indent="0" algn="l" rtl="0">
+              <a:spcBef>
+                <a:spcPts val="0"/>
+              </a:spcBef>
+              <a:spcAft>
+                <a:spcPts val="0"/>
+              </a:spcAft>
+              <a:buNone/>
+            </a:pPr>
+            <a:endParaRPr/>
+          </a:p>
+        </p:txBody>
+      </p:sp>
+    </p:spTree>
+    <p:extLst>
+      <p:ext uri="{BB962C8B-B14F-4D97-AF65-F5344CB8AC3E}">
+        <p14:creationId xmlns:p14="http://schemas.microsoft.com/office/powerpoint/2010/main" val="1966593295"/>
+      </p:ext>
+    </p:extLst>
+  </p:cSld>
+  <p:clrMapOvr>
+    <a:masterClrMapping/>
+  </p:clrMapOvr>
+</p:notes>
+</file>
+
+<file path=ppt/notesSlides/notesSlide18.xml><?xml version="1.0" encoding="utf-8"?>
+<p:notes xmlns:a="http://schemas.openxmlformats.org/drawingml/2006/main" xmlns:r="http://schemas.openxmlformats.org/officeDocument/2006/relationships" xmlns:p="http://schemas.openxmlformats.org/presentationml/2006/main" showMasterSp="0" showMasterPhAnim="0">
+  <p:cSld>
+    <p:spTree>
+      <p:nvGrpSpPr>
+        <p:cNvPr id="1" name="Shape 391"/>
+        <p:cNvGrpSpPr/>
+        <p:nvPr/>
+      </p:nvGrpSpPr>
+      <p:grpSpPr>
+        <a:xfrm>
+          <a:off x="0" y="0"/>
+          <a:ext cx="0" cy="0"/>
+          <a:chOff x="0" y="0"/>
+          <a:chExt cx="0" cy="0"/>
+        </a:xfrm>
+      </p:grpSpPr>
+      <p:sp>
+        <p:nvSpPr>
+          <p:cNvPr id="392" name="Google Shape;392;g5ffbf5f0a7_1_60:notes"/>
+          <p:cNvSpPr>
+            <a:spLocks noGrp="1" noRot="1" noChangeAspect="1"/>
+          </p:cNvSpPr>
+          <p:nvPr>
+            <p:ph type="sldImg" idx="2"/>
+          </p:nvPr>
+        </p:nvSpPr>
+        <p:spPr>
+          <a:xfrm>
+            <a:off x="342900" y="696913"/>
+            <a:ext cx="6196013" cy="3486150"/>
+          </a:xfrm>
+          <a:custGeom>
+            <a:avLst/>
+            <a:gdLst/>
+            <a:ahLst/>
+            <a:cxnLst/>
+            <a:rect l="l" t="t" r="r" b="b"/>
+            <a:pathLst>
+              <a:path w="120000" h="120000" extrusionOk="0">
+                <a:moveTo>
+                  <a:pt x="0" y="0"/>
+                </a:moveTo>
+                <a:lnTo>
+                  <a:pt x="120000" y="0"/>
+                </a:lnTo>
+                <a:lnTo>
+                  <a:pt x="120000" y="120000"/>
+                </a:lnTo>
+                <a:lnTo>
+                  <a:pt x="0" y="120000"/>
+                </a:lnTo>
+                <a:close/>
+              </a:path>
+            </a:pathLst>
+          </a:custGeom>
+        </p:spPr>
+      </p:sp>
+      <p:sp>
+        <p:nvSpPr>
+          <p:cNvPr id="393" name="Google Shape;393;g5ffbf5f0a7_1_60:notes"/>
+          <p:cNvSpPr txBox="1">
+            <a:spLocks noGrp="1"/>
+          </p:cNvSpPr>
+          <p:nvPr>
+            <p:ph type="body" idx="1"/>
+          </p:nvPr>
+        </p:nvSpPr>
+        <p:spPr>
+          <a:xfrm>
+            <a:off x="688180" y="4415790"/>
+            <a:ext cx="5505300" cy="4183500"/>
+          </a:xfrm>
+          <a:prstGeom prst="rect">
+            <a:avLst/>
+          </a:prstGeom>
+        </p:spPr>
+        <p:txBody>
+          <a:bodyPr spcFirstLastPara="1" wrap="square" lIns="92425" tIns="46200" rIns="92425" bIns="46200" anchor="t" anchorCtr="0">
+            <a:noAutofit/>
+          </a:bodyPr>
+          <a:lstStyle/>
+          <a:p>
+            <a:pPr marL="0" lvl="0" indent="0" algn="l" rtl="0">
+              <a:spcBef>
+                <a:spcPts val="0"/>
+              </a:spcBef>
+              <a:spcAft>
+                <a:spcPts val="0"/>
+              </a:spcAft>
+              <a:buNone/>
+            </a:pPr>
+            <a:endParaRPr/>
+          </a:p>
+        </p:txBody>
+      </p:sp>
+    </p:spTree>
+    <p:extLst>
+      <p:ext uri="{BB962C8B-B14F-4D97-AF65-F5344CB8AC3E}">
+        <p14:creationId xmlns:p14="http://schemas.microsoft.com/office/powerpoint/2010/main" val="3568479870"/>
+      </p:ext>
+    </p:extLst>
+  </p:cSld>
+  <p:clrMapOvr>
+    <a:masterClrMapping/>
+  </p:clrMapOvr>
+</p:notes>
+</file>
+
+<file path=ppt/notesSlides/notesSlide19.xml><?xml version="1.0" encoding="utf-8"?>
+<p:notes xmlns:a="http://schemas.openxmlformats.org/drawingml/2006/main" xmlns:r="http://schemas.openxmlformats.org/officeDocument/2006/relationships" xmlns:p="http://schemas.openxmlformats.org/presentationml/2006/main" showMasterSp="0" showMasterPhAnim="0">
+  <p:cSld>
+    <p:spTree>
+      <p:nvGrpSpPr>
+        <p:cNvPr id="1" name="Shape 397"/>
+        <p:cNvGrpSpPr/>
+        <p:nvPr/>
+      </p:nvGrpSpPr>
+      <p:grpSpPr>
+        <a:xfrm>
+          <a:off x="0" y="0"/>
+          <a:ext cx="0" cy="0"/>
+          <a:chOff x="0" y="0"/>
+          <a:chExt cx="0" cy="0"/>
+        </a:xfrm>
+      </p:grpSpPr>
+      <p:sp>
+        <p:nvSpPr>
+          <p:cNvPr id="398" name="Google Shape;398;g5ffbf5f0a7_1_65:notes"/>
+          <p:cNvSpPr>
+            <a:spLocks noGrp="1" noRot="1" noChangeAspect="1"/>
+          </p:cNvSpPr>
+          <p:nvPr>
+            <p:ph type="sldImg" idx="2"/>
+          </p:nvPr>
+        </p:nvSpPr>
+        <p:spPr>
+          <a:xfrm>
+            <a:off x="342900" y="696913"/>
+            <a:ext cx="6196013" cy="3486150"/>
+          </a:xfrm>
+          <a:custGeom>
+            <a:avLst/>
+            <a:gdLst/>
+            <a:ahLst/>
+            <a:cxnLst/>
+            <a:rect l="l" t="t" r="r" b="b"/>
+            <a:pathLst>
+              <a:path w="120000" h="120000" extrusionOk="0">
+                <a:moveTo>
+                  <a:pt x="0" y="0"/>
+                </a:moveTo>
+                <a:lnTo>
+                  <a:pt x="120000" y="0"/>
+                </a:lnTo>
+                <a:lnTo>
+                  <a:pt x="120000" y="120000"/>
+                </a:lnTo>
+                <a:lnTo>
+                  <a:pt x="0" y="120000"/>
+                </a:lnTo>
+                <a:close/>
+              </a:path>
+            </a:pathLst>
+          </a:custGeom>
+        </p:spPr>
+      </p:sp>
+      <p:sp>
+        <p:nvSpPr>
+          <p:cNvPr id="399" name="Google Shape;399;g5ffbf5f0a7_1_65:notes"/>
+          <p:cNvSpPr txBox="1">
+            <a:spLocks noGrp="1"/>
+          </p:cNvSpPr>
+          <p:nvPr>
+            <p:ph type="body" idx="1"/>
+          </p:nvPr>
+        </p:nvSpPr>
+        <p:spPr>
+          <a:xfrm>
+            <a:off x="688180" y="4415790"/>
+            <a:ext cx="5505300" cy="4183500"/>
+          </a:xfrm>
+          <a:prstGeom prst="rect">
+            <a:avLst/>
+          </a:prstGeom>
+        </p:spPr>
+        <p:txBody>
+          <a:bodyPr spcFirstLastPara="1" wrap="square" lIns="92425" tIns="46200" rIns="92425" bIns="46200" anchor="t" anchorCtr="0">
+            <a:noAutofit/>
+          </a:bodyPr>
+          <a:lstStyle/>
+          <a:p>
+            <a:pPr marL="0" lvl="0" indent="0" algn="l" rtl="0">
+              <a:spcBef>
+                <a:spcPts val="0"/>
+              </a:spcBef>
+              <a:spcAft>
+                <a:spcPts val="0"/>
+              </a:spcAft>
+              <a:buNone/>
+            </a:pPr>
+            <a:endParaRPr/>
+          </a:p>
+        </p:txBody>
+      </p:sp>
+    </p:spTree>
+    <p:extLst>
+      <p:ext uri="{BB962C8B-B14F-4D97-AF65-F5344CB8AC3E}">
+        <p14:creationId xmlns:p14="http://schemas.microsoft.com/office/powerpoint/2010/main" val="534594522"/>
+      </p:ext>
+    </p:extLst>
+  </p:cSld>
+  <p:clrMapOvr>
+    <a:masterClrMapping/>
+  </p:clrMapOvr>
+</p:notes>
+</file>
+
+<file path=ppt/notesSlides/notesSlide2.xml><?xml version="1.0" encoding="utf-8"?>
+<p:notes xmlns:a="http://schemas.openxmlformats.org/drawingml/2006/main" xmlns:r="http://schemas.openxmlformats.org/officeDocument/2006/relationships" xmlns:p="http://schemas.openxmlformats.org/presentationml/2006/main" showMasterSp="0" showMasterPhAnim="0">
+  <p:cSld>
+    <p:spTree>
+      <p:nvGrpSpPr>
+        <p:cNvPr id="1" name="Shape 70"/>
+        <p:cNvGrpSpPr/>
+        <p:nvPr/>
+      </p:nvGrpSpPr>
+      <p:grpSpPr>
+        <a:xfrm>
+          <a:off x="0" y="0"/>
+          <a:ext cx="0" cy="0"/>
+          <a:chOff x="0" y="0"/>
+          <a:chExt cx="0" cy="0"/>
+        </a:xfrm>
+      </p:grpSpPr>
+      <p:sp>
+        <p:nvSpPr>
+          <p:cNvPr id="71" name="Google Shape;71;p2:notes"/>
+          <p:cNvSpPr txBox="1">
+            <a:spLocks noGrp="1"/>
+          </p:cNvSpPr>
+          <p:nvPr>
+            <p:ph type="body" idx="1"/>
+          </p:nvPr>
+        </p:nvSpPr>
+        <p:spPr>
+          <a:xfrm>
+            <a:off x="917575" y="4415790"/>
+            <a:ext cx="5046663" cy="4183380"/>
+          </a:xfrm>
+          <a:prstGeom prst="rect">
+            <a:avLst/>
+          </a:prstGeom>
+          <a:noFill/>
+          <a:ln>
+            <a:noFill/>
+          </a:ln>
+        </p:spPr>
+        <p:txBody>
+          <a:bodyPr spcFirstLastPara="1" wrap="square" lIns="92425" tIns="46200" rIns="92425" bIns="46200" anchor="t" anchorCtr="0">
+            <a:noAutofit/>
+          </a:bodyPr>
+          <a:lstStyle/>
+          <a:p>
+            <a:pPr marL="0" lvl="0" indent="0" algn="l" rtl="0">
+              <a:lnSpc>
+                <a:spcPct val="100000"/>
+              </a:lnSpc>
+              <a:spcBef>
+                <a:spcPts val="0"/>
+              </a:spcBef>
+              <a:spcAft>
+                <a:spcPts val="0"/>
+              </a:spcAft>
+              <a:buSzPts val="1400"/>
+              <a:buNone/>
+            </a:pPr>
+            <a:endParaRPr/>
+          </a:p>
+        </p:txBody>
+      </p:sp>
+      <p:sp>
+        <p:nvSpPr>
+          <p:cNvPr id="72" name="Google Shape;72;p2:notes"/>
+          <p:cNvSpPr>
+            <a:spLocks noGrp="1" noRot="1" noChangeAspect="1"/>
+          </p:cNvSpPr>
+          <p:nvPr>
+            <p:ph type="sldImg" idx="2"/>
+          </p:nvPr>
+        </p:nvSpPr>
+        <p:spPr>
+          <a:xfrm>
+            <a:off x="342900" y="696913"/>
+            <a:ext cx="6197600" cy="3486150"/>
+          </a:xfrm>
+          <a:custGeom>
+            <a:avLst/>
+            <a:gdLst/>
+            <a:ahLst/>
+            <a:cxnLst/>
+            <a:rect l="l" t="t" r="r" b="b"/>
+            <a:pathLst>
+              <a:path w="120000" h="120000" extrusionOk="0">
+                <a:moveTo>
+                  <a:pt x="0" y="0"/>
+                </a:moveTo>
+                <a:lnTo>
+                  <a:pt x="120000" y="0"/>
+                </a:lnTo>
+                <a:lnTo>
+                  <a:pt x="120000" y="120000"/>
+                </a:lnTo>
+                <a:lnTo>
+                  <a:pt x="0" y="120000"/>
+                </a:lnTo>
+                <a:close/>
+              </a:path>
+            </a:pathLst>
+          </a:custGeom>
+          <a:noFill/>
+          <a:ln>
+            <a:noFill/>
+          </a:ln>
+        </p:spPr>
+      </p:sp>
+    </p:spTree>
+  </p:cSld>
+  <p:clrMapOvr>
+    <a:masterClrMapping/>
+  </p:clrMapOvr>
+</p:notes>
+</file>
+
+<file path=ppt/notesSlides/notesSlide20.xml><?xml version="1.0" encoding="utf-8"?>
+<p:notes xmlns:a="http://schemas.openxmlformats.org/drawingml/2006/main" xmlns:r="http://schemas.openxmlformats.org/officeDocument/2006/relationships" xmlns:p="http://schemas.openxmlformats.org/presentationml/2006/main" showMasterSp="0" showMasterPhAnim="0">
+  <p:cSld>
+    <p:spTree>
+      <p:nvGrpSpPr>
+        <p:cNvPr id="1" name="Shape 403"/>
+        <p:cNvGrpSpPr/>
+        <p:nvPr/>
+      </p:nvGrpSpPr>
+      <p:grpSpPr>
+        <a:xfrm>
+          <a:off x="0" y="0"/>
+          <a:ext cx="0" cy="0"/>
+          <a:chOff x="0" y="0"/>
+          <a:chExt cx="0" cy="0"/>
+        </a:xfrm>
+      </p:grpSpPr>
+      <p:sp>
+        <p:nvSpPr>
+          <p:cNvPr id="404" name="Google Shape;404;g5ffbf5f0a7_1_70:notes"/>
+          <p:cNvSpPr>
+            <a:spLocks noGrp="1" noRot="1" noChangeAspect="1"/>
+          </p:cNvSpPr>
+          <p:nvPr>
+            <p:ph type="sldImg" idx="2"/>
+          </p:nvPr>
+        </p:nvSpPr>
+        <p:spPr>
+          <a:xfrm>
+            <a:off x="342900" y="696913"/>
+            <a:ext cx="6196013" cy="3486150"/>
+          </a:xfrm>
+          <a:custGeom>
+            <a:avLst/>
+            <a:gdLst/>
+            <a:ahLst/>
+            <a:cxnLst/>
+            <a:rect l="l" t="t" r="r" b="b"/>
+            <a:pathLst>
+              <a:path w="120000" h="120000" extrusionOk="0">
+                <a:moveTo>
+                  <a:pt x="0" y="0"/>
+                </a:moveTo>
+                <a:lnTo>
+                  <a:pt x="120000" y="0"/>
+                </a:lnTo>
+                <a:lnTo>
+                  <a:pt x="120000" y="120000"/>
+                </a:lnTo>
+                <a:lnTo>
+                  <a:pt x="0" y="120000"/>
+                </a:lnTo>
+                <a:close/>
+              </a:path>
+            </a:pathLst>
+          </a:custGeom>
+        </p:spPr>
+      </p:sp>
+      <p:sp>
+        <p:nvSpPr>
+          <p:cNvPr id="405" name="Google Shape;405;g5ffbf5f0a7_1_70:notes"/>
+          <p:cNvSpPr txBox="1">
+            <a:spLocks noGrp="1"/>
+          </p:cNvSpPr>
+          <p:nvPr>
+            <p:ph type="body" idx="1"/>
+          </p:nvPr>
+        </p:nvSpPr>
+        <p:spPr>
+          <a:xfrm>
+            <a:off x="688180" y="4415790"/>
+            <a:ext cx="5505300" cy="4183500"/>
+          </a:xfrm>
+          <a:prstGeom prst="rect">
+            <a:avLst/>
+          </a:prstGeom>
+        </p:spPr>
+        <p:txBody>
+          <a:bodyPr spcFirstLastPara="1" wrap="square" lIns="92425" tIns="46200" rIns="92425" bIns="46200" anchor="t" anchorCtr="0">
+            <a:noAutofit/>
+          </a:bodyPr>
+          <a:lstStyle/>
+          <a:p>
+            <a:pPr marL="0" lvl="0" indent="0" algn="l" rtl="0">
+              <a:spcBef>
+                <a:spcPts val="0"/>
+              </a:spcBef>
+              <a:spcAft>
+                <a:spcPts val="0"/>
+              </a:spcAft>
+              <a:buNone/>
+            </a:pPr>
+            <a:endParaRPr/>
+          </a:p>
+        </p:txBody>
+      </p:sp>
+    </p:spTree>
+    <p:extLst>
+      <p:ext uri="{BB962C8B-B14F-4D97-AF65-F5344CB8AC3E}">
+        <p14:creationId xmlns:p14="http://schemas.microsoft.com/office/powerpoint/2010/main" val="2792398210"/>
+      </p:ext>
+    </p:extLst>
+  </p:cSld>
+  <p:clrMapOvr>
+    <a:masterClrMapping/>
+  </p:clrMapOvr>
+</p:notes>
+</file>
+
+<file path=ppt/notesSlides/notesSlide21.xml><?xml version="1.0" encoding="utf-8"?>
+<p:notes xmlns:a="http://schemas.openxmlformats.org/drawingml/2006/main" xmlns:r="http://schemas.openxmlformats.org/officeDocument/2006/relationships" xmlns:p="http://schemas.openxmlformats.org/presentationml/2006/main" showMasterSp="0" showMasterPhAnim="0">
+  <p:cSld>
+    <p:spTree>
+      <p:nvGrpSpPr>
+        <p:cNvPr id="1" name="Shape 409"/>
+        <p:cNvGrpSpPr/>
+        <p:nvPr/>
+      </p:nvGrpSpPr>
+      <p:grpSpPr>
+        <a:xfrm>
+          <a:off x="0" y="0"/>
+          <a:ext cx="0" cy="0"/>
+          <a:chOff x="0" y="0"/>
+          <a:chExt cx="0" cy="0"/>
+        </a:xfrm>
+      </p:grpSpPr>
+      <p:sp>
+        <p:nvSpPr>
+          <p:cNvPr id="410" name="Google Shape;410;g5ffbf5f0a7_1_75:notes"/>
+          <p:cNvSpPr>
+            <a:spLocks noGrp="1" noRot="1" noChangeAspect="1"/>
+          </p:cNvSpPr>
+          <p:nvPr>
+            <p:ph type="sldImg" idx="2"/>
+          </p:nvPr>
+        </p:nvSpPr>
+        <p:spPr>
+          <a:xfrm>
+            <a:off x="342900" y="696913"/>
+            <a:ext cx="6196013" cy="3486150"/>
+          </a:xfrm>
+          <a:custGeom>
+            <a:avLst/>
+            <a:gdLst/>
+            <a:ahLst/>
+            <a:cxnLst/>
+            <a:rect l="l" t="t" r="r" b="b"/>
+            <a:pathLst>
+              <a:path w="120000" h="120000" extrusionOk="0">
+                <a:moveTo>
+                  <a:pt x="0" y="0"/>
+                </a:moveTo>
+                <a:lnTo>
+                  <a:pt x="120000" y="0"/>
+                </a:lnTo>
+                <a:lnTo>
+                  <a:pt x="120000" y="120000"/>
+                </a:lnTo>
+                <a:lnTo>
+                  <a:pt x="0" y="120000"/>
+                </a:lnTo>
+                <a:close/>
+              </a:path>
+            </a:pathLst>
+          </a:custGeom>
+        </p:spPr>
+      </p:sp>
+      <p:sp>
+        <p:nvSpPr>
+          <p:cNvPr id="411" name="Google Shape;411;g5ffbf5f0a7_1_75:notes"/>
+          <p:cNvSpPr txBox="1">
+            <a:spLocks noGrp="1"/>
+          </p:cNvSpPr>
+          <p:nvPr>
+            <p:ph type="body" idx="1"/>
+          </p:nvPr>
+        </p:nvSpPr>
+        <p:spPr>
+          <a:xfrm>
+            <a:off x="688180" y="4415790"/>
+            <a:ext cx="5505300" cy="4183500"/>
+          </a:xfrm>
+          <a:prstGeom prst="rect">
+            <a:avLst/>
+          </a:prstGeom>
+        </p:spPr>
+        <p:txBody>
+          <a:bodyPr spcFirstLastPara="1" wrap="square" lIns="92425" tIns="46200" rIns="92425" bIns="46200" anchor="t" anchorCtr="0">
+            <a:noAutofit/>
+          </a:bodyPr>
+          <a:lstStyle/>
+          <a:p>
+            <a:pPr marL="0" lvl="0" indent="0" algn="l" rtl="0">
+              <a:spcBef>
+                <a:spcPts val="0"/>
+              </a:spcBef>
+              <a:spcAft>
+                <a:spcPts val="0"/>
+              </a:spcAft>
+              <a:buNone/>
+            </a:pPr>
+            <a:endParaRPr/>
+          </a:p>
+        </p:txBody>
+      </p:sp>
+    </p:spTree>
+    <p:extLst>
+      <p:ext uri="{BB962C8B-B14F-4D97-AF65-F5344CB8AC3E}">
+        <p14:creationId xmlns:p14="http://schemas.microsoft.com/office/powerpoint/2010/main" val="297634800"/>
+      </p:ext>
+    </p:extLst>
+  </p:cSld>
+  <p:clrMapOvr>
+    <a:masterClrMapping/>
+  </p:clrMapOvr>
+</p:notes>
+</file>
+
+<file path=ppt/notesSlides/notesSlide22.xml><?xml version="1.0" encoding="utf-8"?>
+<p:notes xmlns:a="http://schemas.openxmlformats.org/drawingml/2006/main" xmlns:r="http://schemas.openxmlformats.org/officeDocument/2006/relationships" xmlns:p="http://schemas.openxmlformats.org/presentationml/2006/main" showMasterSp="0" showMasterPhAnim="0">
+  <p:cSld>
+    <p:spTree>
+      <p:nvGrpSpPr>
+        <p:cNvPr id="1" name="Shape 415"/>
+        <p:cNvGrpSpPr/>
+        <p:nvPr/>
+      </p:nvGrpSpPr>
+      <p:grpSpPr>
+        <a:xfrm>
+          <a:off x="0" y="0"/>
+          <a:ext cx="0" cy="0"/>
+          <a:chOff x="0" y="0"/>
+          <a:chExt cx="0" cy="0"/>
+        </a:xfrm>
+      </p:grpSpPr>
+      <p:sp>
+        <p:nvSpPr>
+          <p:cNvPr id="416" name="Google Shape;416;g5ffbf5f0a7_1_80:notes"/>
+          <p:cNvSpPr>
+            <a:spLocks noGrp="1" noRot="1" noChangeAspect="1"/>
+          </p:cNvSpPr>
+          <p:nvPr>
+            <p:ph type="sldImg" idx="2"/>
+          </p:nvPr>
+        </p:nvSpPr>
+        <p:spPr>
+          <a:xfrm>
+            <a:off x="342900" y="696913"/>
+            <a:ext cx="6196013" cy="3486150"/>
+          </a:xfrm>
+          <a:custGeom>
+            <a:avLst/>
+            <a:gdLst/>
+            <a:ahLst/>
+            <a:cxnLst/>
+            <a:rect l="l" t="t" r="r" b="b"/>
+            <a:pathLst>
+              <a:path w="120000" h="120000" extrusionOk="0">
+                <a:moveTo>
+                  <a:pt x="0" y="0"/>
+                </a:moveTo>
+                <a:lnTo>
+                  <a:pt x="120000" y="0"/>
+                </a:lnTo>
+                <a:lnTo>
+                  <a:pt x="120000" y="120000"/>
+                </a:lnTo>
+                <a:lnTo>
+                  <a:pt x="0" y="120000"/>
+                </a:lnTo>
+                <a:close/>
+              </a:path>
+            </a:pathLst>
+          </a:custGeom>
+        </p:spPr>
+      </p:sp>
+      <p:sp>
+        <p:nvSpPr>
+          <p:cNvPr id="417" name="Google Shape;417;g5ffbf5f0a7_1_80:notes"/>
+          <p:cNvSpPr txBox="1">
+            <a:spLocks noGrp="1"/>
+          </p:cNvSpPr>
+          <p:nvPr>
+            <p:ph type="body" idx="1"/>
+          </p:nvPr>
+        </p:nvSpPr>
+        <p:spPr>
+          <a:xfrm>
+            <a:off x="688180" y="4415790"/>
+            <a:ext cx="5505300" cy="4183500"/>
+          </a:xfrm>
+          <a:prstGeom prst="rect">
+            <a:avLst/>
+          </a:prstGeom>
+        </p:spPr>
+        <p:txBody>
+          <a:bodyPr spcFirstLastPara="1" wrap="square" lIns="92425" tIns="46200" rIns="92425" bIns="46200" anchor="t" anchorCtr="0">
+            <a:noAutofit/>
+          </a:bodyPr>
+          <a:lstStyle/>
+          <a:p>
+            <a:pPr marL="0" lvl="0" indent="0" algn="l" rtl="0">
+              <a:spcBef>
+                <a:spcPts val="0"/>
+              </a:spcBef>
+              <a:spcAft>
+                <a:spcPts val="0"/>
+              </a:spcAft>
+              <a:buNone/>
+            </a:pPr>
+            <a:endParaRPr/>
+          </a:p>
+        </p:txBody>
+      </p:sp>
+    </p:spTree>
+    <p:extLst>
+      <p:ext uri="{BB962C8B-B14F-4D97-AF65-F5344CB8AC3E}">
+        <p14:creationId xmlns:p14="http://schemas.microsoft.com/office/powerpoint/2010/main" val="1926908638"/>
+      </p:ext>
+    </p:extLst>
+  </p:cSld>
+  <p:clrMapOvr>
+    <a:masterClrMapping/>
+  </p:clrMapOvr>
+</p:notes>
+</file>
+
+<file path=ppt/notesSlides/notesSlide23.xml><?xml version="1.0" encoding="utf-8"?>
+<p:notes xmlns:a="http://schemas.openxmlformats.org/drawingml/2006/main" xmlns:r="http://schemas.openxmlformats.org/officeDocument/2006/relationships" xmlns:p="http://schemas.openxmlformats.org/presentationml/2006/main" showMasterSp="0" showMasterPhAnim="0">
+  <p:cSld>
+    <p:spTree>
+      <p:nvGrpSpPr>
+        <p:cNvPr id="1" name="Shape 429"/>
+        <p:cNvGrpSpPr/>
+        <p:nvPr/>
+      </p:nvGrpSpPr>
+      <p:grpSpPr>
+        <a:xfrm>
+          <a:off x="0" y="0"/>
+          <a:ext cx="0" cy="0"/>
+          <a:chOff x="0" y="0"/>
+          <a:chExt cx="0" cy="0"/>
+        </a:xfrm>
+      </p:grpSpPr>
+      <p:sp>
+        <p:nvSpPr>
+          <p:cNvPr id="430" name="Google Shape;430;g5ffbf5f0a7_1_92:notes"/>
+          <p:cNvSpPr>
+            <a:spLocks noGrp="1" noRot="1" noChangeAspect="1"/>
+          </p:cNvSpPr>
+          <p:nvPr>
+            <p:ph type="sldImg" idx="2"/>
+          </p:nvPr>
+        </p:nvSpPr>
+        <p:spPr>
+          <a:xfrm>
+            <a:off x="342900" y="696913"/>
+            <a:ext cx="6196013" cy="3486150"/>
+          </a:xfrm>
+          <a:custGeom>
+            <a:avLst/>
+            <a:gdLst/>
+            <a:ahLst/>
+            <a:cxnLst/>
+            <a:rect l="l" t="t" r="r" b="b"/>
+            <a:pathLst>
+              <a:path w="120000" h="120000" extrusionOk="0">
+                <a:moveTo>
+                  <a:pt x="0" y="0"/>
+                </a:moveTo>
+                <a:lnTo>
+                  <a:pt x="120000" y="0"/>
+                </a:lnTo>
+                <a:lnTo>
+                  <a:pt x="120000" y="120000"/>
+                </a:lnTo>
+                <a:lnTo>
+                  <a:pt x="0" y="120000"/>
+                </a:lnTo>
+                <a:close/>
+              </a:path>
+            </a:pathLst>
+          </a:custGeom>
+        </p:spPr>
+      </p:sp>
+      <p:sp>
+        <p:nvSpPr>
+          <p:cNvPr id="431" name="Google Shape;431;g5ffbf5f0a7_1_92:notes"/>
+          <p:cNvSpPr txBox="1">
+            <a:spLocks noGrp="1"/>
+          </p:cNvSpPr>
+          <p:nvPr>
+            <p:ph type="body" idx="1"/>
+          </p:nvPr>
+        </p:nvSpPr>
+        <p:spPr>
+          <a:xfrm>
+            <a:off x="688180" y="4415790"/>
+            <a:ext cx="5505300" cy="4183500"/>
+          </a:xfrm>
+          <a:prstGeom prst="rect">
+            <a:avLst/>
+          </a:prstGeom>
+        </p:spPr>
+        <p:txBody>
+          <a:bodyPr spcFirstLastPara="1" wrap="square" lIns="92425" tIns="46200" rIns="92425" bIns="46200" anchor="t" anchorCtr="0">
+            <a:noAutofit/>
+          </a:bodyPr>
+          <a:lstStyle/>
+          <a:p>
+            <a:pPr marL="0" lvl="0" indent="0" algn="l" rtl="0">
+              <a:spcBef>
+                <a:spcPts val="0"/>
+              </a:spcBef>
+              <a:spcAft>
+                <a:spcPts val="0"/>
+              </a:spcAft>
+              <a:buNone/>
+            </a:pPr>
+            <a:endParaRPr/>
+          </a:p>
+        </p:txBody>
+      </p:sp>
+    </p:spTree>
+    <p:extLst>
+      <p:ext uri="{BB962C8B-B14F-4D97-AF65-F5344CB8AC3E}">
+        <p14:creationId xmlns:p14="http://schemas.microsoft.com/office/powerpoint/2010/main" val="3101716294"/>
+      </p:ext>
+    </p:extLst>
+  </p:cSld>
+  <p:clrMapOvr>
+    <a:masterClrMapping/>
+  </p:clrMapOvr>
+</p:notes>
+</file>
+
+<file path=ppt/notesSlides/notesSlide24.xml><?xml version="1.0" encoding="utf-8"?>
+<p:notes xmlns:a="http://schemas.openxmlformats.org/drawingml/2006/main" xmlns:r="http://schemas.openxmlformats.org/officeDocument/2006/relationships" xmlns:p="http://schemas.openxmlformats.org/presentationml/2006/main" showMasterSp="0" showMasterPhAnim="0">
+  <p:cSld>
+    <p:spTree>
+      <p:nvGrpSpPr>
+        <p:cNvPr id="1" name="Shape 436"/>
+        <p:cNvGrpSpPr/>
+        <p:nvPr/>
+      </p:nvGrpSpPr>
+      <p:grpSpPr>
+        <a:xfrm>
+          <a:off x="0" y="0"/>
+          <a:ext cx="0" cy="0"/>
+          <a:chOff x="0" y="0"/>
+          <a:chExt cx="0" cy="0"/>
+        </a:xfrm>
+      </p:grpSpPr>
+      <p:sp>
+        <p:nvSpPr>
+          <p:cNvPr id="437" name="Google Shape;437;g5ffbf5f0a7_1_98:notes"/>
+          <p:cNvSpPr>
+            <a:spLocks noGrp="1" noRot="1" noChangeAspect="1"/>
+          </p:cNvSpPr>
+          <p:nvPr>
+            <p:ph type="sldImg" idx="2"/>
+          </p:nvPr>
+        </p:nvSpPr>
+        <p:spPr>
+          <a:xfrm>
+            <a:off x="342900" y="696913"/>
+            <a:ext cx="6196013" cy="3486150"/>
+          </a:xfrm>
+          <a:custGeom>
+            <a:avLst/>
+            <a:gdLst/>
+            <a:ahLst/>
+            <a:cxnLst/>
+            <a:rect l="l" t="t" r="r" b="b"/>
+            <a:pathLst>
+              <a:path w="120000" h="120000" extrusionOk="0">
+                <a:moveTo>
+                  <a:pt x="0" y="0"/>
+                </a:moveTo>
+                <a:lnTo>
+                  <a:pt x="120000" y="0"/>
+                </a:lnTo>
+                <a:lnTo>
+                  <a:pt x="120000" y="120000"/>
+                </a:lnTo>
+                <a:lnTo>
+                  <a:pt x="0" y="120000"/>
+                </a:lnTo>
+                <a:close/>
+              </a:path>
+            </a:pathLst>
+          </a:custGeom>
+        </p:spPr>
+      </p:sp>
+      <p:sp>
+        <p:nvSpPr>
+          <p:cNvPr id="438" name="Google Shape;438;g5ffbf5f0a7_1_98:notes"/>
+          <p:cNvSpPr txBox="1">
+            <a:spLocks noGrp="1"/>
+          </p:cNvSpPr>
+          <p:nvPr>
+            <p:ph type="body" idx="1"/>
+          </p:nvPr>
+        </p:nvSpPr>
+        <p:spPr>
+          <a:xfrm>
+            <a:off x="688180" y="4415790"/>
+            <a:ext cx="5505300" cy="4183500"/>
+          </a:xfrm>
+          <a:prstGeom prst="rect">
+            <a:avLst/>
+          </a:prstGeom>
+        </p:spPr>
+        <p:txBody>
+          <a:bodyPr spcFirstLastPara="1" wrap="square" lIns="92425" tIns="46200" rIns="92425" bIns="46200" anchor="t" anchorCtr="0">
+            <a:noAutofit/>
+          </a:bodyPr>
+          <a:lstStyle/>
+          <a:p>
+            <a:pPr marL="0" lvl="0" indent="0" algn="l" rtl="0">
+              <a:spcBef>
+                <a:spcPts val="0"/>
+              </a:spcBef>
+              <a:spcAft>
+                <a:spcPts val="0"/>
+              </a:spcAft>
+              <a:buNone/>
+            </a:pPr>
+            <a:endParaRPr/>
+          </a:p>
+        </p:txBody>
+      </p:sp>
+    </p:spTree>
+    <p:extLst>
+      <p:ext uri="{BB962C8B-B14F-4D97-AF65-F5344CB8AC3E}">
+        <p14:creationId xmlns:p14="http://schemas.microsoft.com/office/powerpoint/2010/main" val="2515384844"/>
+      </p:ext>
+    </p:extLst>
+  </p:cSld>
+  <p:clrMapOvr>
+    <a:masterClrMapping/>
+  </p:clrMapOvr>
+</p:notes>
+</file>
+
+<file path=ppt/notesSlides/notesSlide25.xml><?xml version="1.0" encoding="utf-8"?>
+<p:notes xmlns:a="http://schemas.openxmlformats.org/drawingml/2006/main" xmlns:r="http://schemas.openxmlformats.org/officeDocument/2006/relationships" xmlns:p="http://schemas.openxmlformats.org/presentationml/2006/main" showMasterSp="0" showMasterPhAnim="0">
+  <p:cSld>
+    <p:spTree>
+      <p:nvGrpSpPr>
+        <p:cNvPr id="1" name="Shape 443"/>
+        <p:cNvGrpSpPr/>
+        <p:nvPr/>
+      </p:nvGrpSpPr>
+      <p:grpSpPr>
+        <a:xfrm>
+          <a:off x="0" y="0"/>
+          <a:ext cx="0" cy="0"/>
+          <a:chOff x="0" y="0"/>
+          <a:chExt cx="0" cy="0"/>
+        </a:xfrm>
+      </p:grpSpPr>
+      <p:sp>
+        <p:nvSpPr>
+          <p:cNvPr id="444" name="Google Shape;444;g5ffbf5f0a7_1_104:notes"/>
+          <p:cNvSpPr>
+            <a:spLocks noGrp="1" noRot="1" noChangeAspect="1"/>
+          </p:cNvSpPr>
+          <p:nvPr>
+            <p:ph type="sldImg" idx="2"/>
+          </p:nvPr>
+        </p:nvSpPr>
+        <p:spPr>
+          <a:xfrm>
+            <a:off x="342900" y="696913"/>
+            <a:ext cx="6196013" cy="3486150"/>
+          </a:xfrm>
+          <a:custGeom>
+            <a:avLst/>
+            <a:gdLst/>
+            <a:ahLst/>
+            <a:cxnLst/>
+            <a:rect l="l" t="t" r="r" b="b"/>
+            <a:pathLst>
+              <a:path w="120000" h="120000" extrusionOk="0">
+                <a:moveTo>
+                  <a:pt x="0" y="0"/>
+                </a:moveTo>
+                <a:lnTo>
+                  <a:pt x="120000" y="0"/>
+                </a:lnTo>
+                <a:lnTo>
+                  <a:pt x="120000" y="120000"/>
+                </a:lnTo>
+                <a:lnTo>
+                  <a:pt x="0" y="120000"/>
+                </a:lnTo>
+                <a:close/>
+              </a:path>
+            </a:pathLst>
+          </a:custGeom>
+        </p:spPr>
+      </p:sp>
+      <p:sp>
+        <p:nvSpPr>
+          <p:cNvPr id="445" name="Google Shape;445;g5ffbf5f0a7_1_104:notes"/>
+          <p:cNvSpPr txBox="1">
+            <a:spLocks noGrp="1"/>
+          </p:cNvSpPr>
+          <p:nvPr>
+            <p:ph type="body" idx="1"/>
+          </p:nvPr>
+        </p:nvSpPr>
+        <p:spPr>
+          <a:xfrm>
+            <a:off x="688180" y="4415790"/>
+            <a:ext cx="5505300" cy="4183500"/>
+          </a:xfrm>
+          <a:prstGeom prst="rect">
+            <a:avLst/>
+          </a:prstGeom>
+        </p:spPr>
+        <p:txBody>
+          <a:bodyPr spcFirstLastPara="1" wrap="square" lIns="92425" tIns="46200" rIns="92425" bIns="46200" anchor="t" anchorCtr="0">
+            <a:noAutofit/>
+          </a:bodyPr>
+          <a:lstStyle/>
+          <a:p>
+            <a:pPr marL="0" lvl="0" indent="0" algn="l" rtl="0">
+              <a:spcBef>
+                <a:spcPts val="0"/>
+              </a:spcBef>
+              <a:spcAft>
+                <a:spcPts val="0"/>
+              </a:spcAft>
+              <a:buNone/>
+            </a:pPr>
+            <a:endParaRPr/>
+          </a:p>
+        </p:txBody>
+      </p:sp>
+    </p:spTree>
+    <p:extLst>
+      <p:ext uri="{BB962C8B-B14F-4D97-AF65-F5344CB8AC3E}">
+        <p14:creationId xmlns:p14="http://schemas.microsoft.com/office/powerpoint/2010/main" val="1280448877"/>
+      </p:ext>
+    </p:extLst>
+  </p:cSld>
+  <p:clrMapOvr>
+    <a:masterClrMapping/>
+  </p:clrMapOvr>
+</p:notes>
+</file>
+
+<file path=ppt/notesSlides/notesSlide26.xml><?xml version="1.0" encoding="utf-8"?>
 <p:notes xmlns:a="http://schemas.openxmlformats.org/drawingml/2006/main" xmlns:r="http://schemas.openxmlformats.org/officeDocument/2006/relationships" xmlns:p="http://schemas.openxmlformats.org/presentationml/2006/main" showMasterSp="0" showMasterPhAnim="0">
   <p:cSld>
     <p:spTree>
@@ -2181,7 +3351,7 @@
 </p:notes>
 </file>
 
-<file path=ppt/notesSlides/notesSlide18.xml><?xml version="1.0" encoding="utf-8"?>
+<file path=ppt/notesSlides/notesSlide27.xml><?xml version="1.0" encoding="utf-8"?>
 <p:notes xmlns:a="http://schemas.openxmlformats.org/drawingml/2006/main" xmlns:r="http://schemas.openxmlformats.org/officeDocument/2006/relationships" xmlns:p="http://schemas.openxmlformats.org/presentationml/2006/main" showMasterSp="0" showMasterPhAnim="0">
   <p:cSld>
     <p:spTree>
@@ -2375,7 +3545,7 @@
 </p:notes>
 </file>
 
-<file path=ppt/notesSlides/notesSlide19.xml><?xml version="1.0" encoding="utf-8"?>
+<file path=ppt/notesSlides/notesSlide28.xml><?xml version="1.0" encoding="utf-8"?>
 <p:notes xmlns:a="http://schemas.openxmlformats.org/drawingml/2006/main" xmlns:r="http://schemas.openxmlformats.org/officeDocument/2006/relationships" xmlns:p="http://schemas.openxmlformats.org/presentationml/2006/main" showMasterSp="0" showMasterPhAnim="0">
   <p:cSld>
     <p:spTree>
@@ -2441,122 +3611,6 @@
       <p:sp>
         <p:nvSpPr>
           <p:cNvPr id="306" name="Google Shape;306;p34:notes"/>
-          <p:cNvSpPr>
-            <a:spLocks noGrp="1" noRot="1" noChangeAspect="1"/>
-          </p:cNvSpPr>
-          <p:nvPr>
-            <p:ph type="sldImg" idx="2"/>
-          </p:nvPr>
-        </p:nvSpPr>
-        <p:spPr>
-          <a:xfrm>
-            <a:off x="342900" y="696913"/>
-            <a:ext cx="6197600" cy="3486150"/>
-          </a:xfrm>
-          <a:custGeom>
-            <a:avLst/>
-            <a:gdLst/>
-            <a:ahLst/>
-            <a:cxnLst/>
-            <a:rect l="l" t="t" r="r" b="b"/>
-            <a:pathLst>
-              <a:path w="120000" h="120000" extrusionOk="0">
-                <a:moveTo>
-                  <a:pt x="0" y="0"/>
-                </a:moveTo>
-                <a:lnTo>
-                  <a:pt x="120000" y="0"/>
-                </a:lnTo>
-                <a:lnTo>
-                  <a:pt x="120000" y="120000"/>
-                </a:lnTo>
-                <a:lnTo>
-                  <a:pt x="0" y="120000"/>
-                </a:lnTo>
-                <a:close/>
-              </a:path>
-            </a:pathLst>
-          </a:custGeom>
-          <a:noFill/>
-          <a:ln>
-            <a:noFill/>
-          </a:ln>
-        </p:spPr>
-      </p:sp>
-    </p:spTree>
-  </p:cSld>
-  <p:clrMapOvr>
-    <a:masterClrMapping/>
-  </p:clrMapOvr>
-</p:notes>
-</file>
-
-<file path=ppt/notesSlides/notesSlide2.xml><?xml version="1.0" encoding="utf-8"?>
-<p:notes xmlns:a="http://schemas.openxmlformats.org/drawingml/2006/main" xmlns:r="http://schemas.openxmlformats.org/officeDocument/2006/relationships" xmlns:p="http://schemas.openxmlformats.org/presentationml/2006/main" showMasterSp="0" showMasterPhAnim="0">
-  <p:cSld>
-    <p:spTree>
-      <p:nvGrpSpPr>
-        <p:cNvPr id="1" name="Shape 70"/>
-        <p:cNvGrpSpPr/>
-        <p:nvPr/>
-      </p:nvGrpSpPr>
-      <p:grpSpPr>
-        <a:xfrm>
-          <a:off x="0" y="0"/>
-          <a:ext cx="0" cy="0"/>
-          <a:chOff x="0" y="0"/>
-          <a:chExt cx="0" cy="0"/>
-        </a:xfrm>
-      </p:grpSpPr>
-      <p:sp>
-        <p:nvSpPr>
-          <p:cNvPr id="71" name="Google Shape;71;p2:notes"/>
-          <p:cNvSpPr txBox="1">
-            <a:spLocks noGrp="1"/>
-          </p:cNvSpPr>
-          <p:nvPr>
-            <p:ph type="body" idx="1"/>
-          </p:nvPr>
-        </p:nvSpPr>
-        <p:spPr>
-          <a:xfrm>
-            <a:off x="917575" y="4415790"/>
-            <a:ext cx="5046663" cy="4183380"/>
-          </a:xfrm>
-          <a:prstGeom prst="rect">
-            <a:avLst/>
-          </a:prstGeom>
-          <a:noFill/>
-          <a:ln>
-            <a:noFill/>
-          </a:ln>
-        </p:spPr>
-        <p:txBody>
-          <a:bodyPr spcFirstLastPara="1" wrap="square" lIns="92425" tIns="46200" rIns="92425" bIns="46200" anchor="t" anchorCtr="0">
-            <a:noAutofit/>
-          </a:bodyPr>
-          <a:lstStyle/>
-          <a:p>
-            <a:pPr marL="0" lvl="0" indent="0" algn="l" rtl="0">
-              <a:lnSpc>
-                <a:spcPct val="100000"/>
-              </a:lnSpc>
-              <a:spcBef>
-                <a:spcPts val="0"/>
-              </a:spcBef>
-              <a:spcAft>
-                <a:spcPts val="0"/>
-              </a:spcAft>
-              <a:buSzPts val="1400"/>
-              <a:buNone/>
-            </a:pPr>
-            <a:endParaRPr/>
-          </a:p>
-        </p:txBody>
-      </p:sp>
-      <p:sp>
-        <p:nvSpPr>
-          <p:cNvPr id="72" name="Google Shape;72;p2:notes"/>
           <p:cNvSpPr>
             <a:spLocks noGrp="1" noRot="1" noChangeAspect="1"/>
           </p:cNvSpPr>
@@ -3984,6 +5038,546 @@
 </p:sldLayout>
 </file>
 
+<file path=ppt/slideLayouts/slideLayout10.xml><?xml version="1.0" encoding="utf-8"?>
+<p:sldLayout xmlns:a="http://schemas.openxmlformats.org/drawingml/2006/main" xmlns:r="http://schemas.openxmlformats.org/officeDocument/2006/relationships" xmlns:p="http://schemas.openxmlformats.org/presentationml/2006/main" matchingName="White - 1 column">
+  <p:cSld name="White - 1 column">
+    <p:bg>
+      <p:bgPr>
+        <a:solidFill>
+          <a:srgbClr val="FFFFFF"/>
+        </a:solidFill>
+        <a:effectLst/>
+      </p:bgPr>
+    </p:bg>
+    <p:spTree>
+      <p:nvGrpSpPr>
+        <p:cNvPr id="1" name="Shape 93"/>
+        <p:cNvGrpSpPr/>
+        <p:nvPr/>
+      </p:nvGrpSpPr>
+      <p:grpSpPr>
+        <a:xfrm>
+          <a:off x="0" y="0"/>
+          <a:ext cx="0" cy="0"/>
+          <a:chOff x="0" y="0"/>
+          <a:chExt cx="0" cy="0"/>
+        </a:xfrm>
+      </p:grpSpPr>
+      <p:sp>
+        <p:nvSpPr>
+          <p:cNvPr id="94" name="Google Shape;94;p22"/>
+          <p:cNvSpPr txBox="1">
+            <a:spLocks noGrp="1"/>
+          </p:cNvSpPr>
+          <p:nvPr>
+            <p:ph type="ctrTitle"/>
+          </p:nvPr>
+        </p:nvSpPr>
+        <p:spPr>
+          <a:xfrm>
+            <a:off x="1351815" y="548792"/>
+            <a:ext cx="14007600" cy="1600800"/>
+          </a:xfrm>
+          <a:prstGeom prst="rect">
+            <a:avLst/>
+          </a:prstGeom>
+        </p:spPr>
+        <p:txBody>
+          <a:bodyPr spcFirstLastPara="1" wrap="square" lIns="173375" tIns="173375" rIns="173375" bIns="173375" anchor="t" anchorCtr="0">
+            <a:noAutofit/>
+          </a:bodyPr>
+          <a:lstStyle>
+            <a:lvl1pPr lvl="0" rtl="0">
+              <a:lnSpc>
+                <a:spcPct val="100000"/>
+              </a:lnSpc>
+              <a:spcBef>
+                <a:spcPts val="0"/>
+              </a:spcBef>
+              <a:spcAft>
+                <a:spcPts val="0"/>
+              </a:spcAft>
+              <a:buClr>
+                <a:srgbClr val="046B99"/>
+              </a:buClr>
+              <a:buSzPts val="4900"/>
+              <a:buNone/>
+              <a:defRPr sz="4900" b="1">
+                <a:solidFill>
+                  <a:srgbClr val="046B99"/>
+                </a:solidFill>
+              </a:defRPr>
+            </a:lvl1pPr>
+            <a:lvl2pPr lvl="1" algn="ctr" rtl="0">
+              <a:spcBef>
+                <a:spcPts val="0"/>
+              </a:spcBef>
+              <a:spcAft>
+                <a:spcPts val="0"/>
+              </a:spcAft>
+              <a:buClr>
+                <a:srgbClr val="1C304A"/>
+              </a:buClr>
+              <a:buSzPts val="5300"/>
+              <a:buNone/>
+              <a:defRPr>
+                <a:solidFill>
+                  <a:srgbClr val="1C304A"/>
+                </a:solidFill>
+              </a:defRPr>
+            </a:lvl2pPr>
+            <a:lvl3pPr lvl="2" algn="ctr" rtl="0">
+              <a:spcBef>
+                <a:spcPts val="0"/>
+              </a:spcBef>
+              <a:spcAft>
+                <a:spcPts val="0"/>
+              </a:spcAft>
+              <a:buClr>
+                <a:srgbClr val="1C304A"/>
+              </a:buClr>
+              <a:buSzPts val="5300"/>
+              <a:buNone/>
+              <a:defRPr>
+                <a:solidFill>
+                  <a:srgbClr val="1C304A"/>
+                </a:solidFill>
+              </a:defRPr>
+            </a:lvl3pPr>
+            <a:lvl4pPr lvl="3" algn="ctr" rtl="0">
+              <a:spcBef>
+                <a:spcPts val="0"/>
+              </a:spcBef>
+              <a:spcAft>
+                <a:spcPts val="0"/>
+              </a:spcAft>
+              <a:buClr>
+                <a:srgbClr val="1C304A"/>
+              </a:buClr>
+              <a:buSzPts val="5300"/>
+              <a:buNone/>
+              <a:defRPr>
+                <a:solidFill>
+                  <a:srgbClr val="1C304A"/>
+                </a:solidFill>
+              </a:defRPr>
+            </a:lvl4pPr>
+            <a:lvl5pPr lvl="4" algn="ctr" rtl="0">
+              <a:spcBef>
+                <a:spcPts val="0"/>
+              </a:spcBef>
+              <a:spcAft>
+                <a:spcPts val="0"/>
+              </a:spcAft>
+              <a:buClr>
+                <a:srgbClr val="1C304A"/>
+              </a:buClr>
+              <a:buSzPts val="5300"/>
+              <a:buNone/>
+              <a:defRPr>
+                <a:solidFill>
+                  <a:srgbClr val="1C304A"/>
+                </a:solidFill>
+              </a:defRPr>
+            </a:lvl5pPr>
+            <a:lvl6pPr lvl="5" algn="ctr" rtl="0">
+              <a:spcBef>
+                <a:spcPts val="0"/>
+              </a:spcBef>
+              <a:spcAft>
+                <a:spcPts val="0"/>
+              </a:spcAft>
+              <a:buClr>
+                <a:srgbClr val="1C304A"/>
+              </a:buClr>
+              <a:buSzPts val="5300"/>
+              <a:buNone/>
+              <a:defRPr>
+                <a:solidFill>
+                  <a:srgbClr val="1C304A"/>
+                </a:solidFill>
+              </a:defRPr>
+            </a:lvl6pPr>
+            <a:lvl7pPr lvl="6" algn="ctr" rtl="0">
+              <a:spcBef>
+                <a:spcPts val="0"/>
+              </a:spcBef>
+              <a:spcAft>
+                <a:spcPts val="0"/>
+              </a:spcAft>
+              <a:buClr>
+                <a:srgbClr val="1C304A"/>
+              </a:buClr>
+              <a:buSzPts val="5300"/>
+              <a:buNone/>
+              <a:defRPr>
+                <a:solidFill>
+                  <a:srgbClr val="1C304A"/>
+                </a:solidFill>
+              </a:defRPr>
+            </a:lvl7pPr>
+            <a:lvl8pPr lvl="7" algn="ctr" rtl="0">
+              <a:spcBef>
+                <a:spcPts val="0"/>
+              </a:spcBef>
+              <a:spcAft>
+                <a:spcPts val="0"/>
+              </a:spcAft>
+              <a:buClr>
+                <a:srgbClr val="1C304A"/>
+              </a:buClr>
+              <a:buSzPts val="5300"/>
+              <a:buNone/>
+              <a:defRPr>
+                <a:solidFill>
+                  <a:srgbClr val="1C304A"/>
+                </a:solidFill>
+              </a:defRPr>
+            </a:lvl8pPr>
+            <a:lvl9pPr lvl="8" algn="ctr" rtl="0">
+              <a:spcBef>
+                <a:spcPts val="0"/>
+              </a:spcBef>
+              <a:spcAft>
+                <a:spcPts val="0"/>
+              </a:spcAft>
+              <a:buClr>
+                <a:srgbClr val="1C304A"/>
+              </a:buClr>
+              <a:buSzPts val="5300"/>
+              <a:buNone/>
+              <a:defRPr>
+                <a:solidFill>
+                  <a:srgbClr val="1C304A"/>
+                </a:solidFill>
+              </a:defRPr>
+            </a:lvl9pPr>
+          </a:lstStyle>
+          <a:p>
+            <a:endParaRPr/>
+          </a:p>
+        </p:txBody>
+      </p:sp>
+      <p:sp>
+        <p:nvSpPr>
+          <p:cNvPr id="95" name="Google Shape;95;p22"/>
+          <p:cNvSpPr txBox="1">
+            <a:spLocks noGrp="1"/>
+          </p:cNvSpPr>
+          <p:nvPr>
+            <p:ph type="body" idx="1"/>
+          </p:nvPr>
+        </p:nvSpPr>
+        <p:spPr>
+          <a:xfrm>
+            <a:off x="1182186" y="3152357"/>
+            <a:ext cx="14965200" cy="6478500"/>
+          </a:xfrm>
+          <a:prstGeom prst="rect">
+            <a:avLst/>
+          </a:prstGeom>
+        </p:spPr>
+        <p:txBody>
+          <a:bodyPr spcFirstLastPara="1" wrap="square" lIns="173375" tIns="173375" rIns="173375" bIns="173375" anchor="t" anchorCtr="0">
+            <a:noAutofit/>
+          </a:bodyPr>
+          <a:lstStyle>
+            <a:lvl1pPr marL="457200" lvl="0" indent="-444500" rtl="0">
+              <a:spcBef>
+                <a:spcPts val="0"/>
+              </a:spcBef>
+              <a:spcAft>
+                <a:spcPts val="0"/>
+              </a:spcAft>
+              <a:buClr>
+                <a:srgbClr val="1C304A"/>
+              </a:buClr>
+              <a:buSzPts val="3400"/>
+              <a:buChar char="●"/>
+              <a:defRPr>
+                <a:solidFill>
+                  <a:srgbClr val="1C304A"/>
+                </a:solidFill>
+              </a:defRPr>
+            </a:lvl1pPr>
+            <a:lvl2pPr marL="914400" lvl="1" indent="-400050" rtl="0">
+              <a:spcBef>
+                <a:spcPts val="3000"/>
+              </a:spcBef>
+              <a:spcAft>
+                <a:spcPts val="0"/>
+              </a:spcAft>
+              <a:buClr>
+                <a:srgbClr val="1C304A"/>
+              </a:buClr>
+              <a:buSzPts val="2700"/>
+              <a:buChar char="○"/>
+              <a:defRPr>
+                <a:solidFill>
+                  <a:srgbClr val="1C304A"/>
+                </a:solidFill>
+              </a:defRPr>
+            </a:lvl2pPr>
+            <a:lvl3pPr marL="1371600" lvl="2" indent="-400050" rtl="0">
+              <a:spcBef>
+                <a:spcPts val="3000"/>
+              </a:spcBef>
+              <a:spcAft>
+                <a:spcPts val="0"/>
+              </a:spcAft>
+              <a:buClr>
+                <a:srgbClr val="1C304A"/>
+              </a:buClr>
+              <a:buSzPts val="2700"/>
+              <a:buChar char="■"/>
+              <a:defRPr>
+                <a:solidFill>
+                  <a:srgbClr val="1C304A"/>
+                </a:solidFill>
+              </a:defRPr>
+            </a:lvl3pPr>
+            <a:lvl4pPr marL="1828800" lvl="3" indent="-374650" rtl="0">
+              <a:spcBef>
+                <a:spcPts val="3000"/>
+              </a:spcBef>
+              <a:spcAft>
+                <a:spcPts val="0"/>
+              </a:spcAft>
+              <a:buClr>
+                <a:srgbClr val="1C304A"/>
+              </a:buClr>
+              <a:buSzPts val="2300"/>
+              <a:buChar char="●"/>
+              <a:defRPr>
+                <a:solidFill>
+                  <a:srgbClr val="1C304A"/>
+                </a:solidFill>
+              </a:defRPr>
+            </a:lvl4pPr>
+            <a:lvl5pPr marL="2286000" lvl="4" indent="-349250" rtl="0">
+              <a:spcBef>
+                <a:spcPts val="3000"/>
+              </a:spcBef>
+              <a:spcAft>
+                <a:spcPts val="0"/>
+              </a:spcAft>
+              <a:buClr>
+                <a:srgbClr val="1C304A"/>
+              </a:buClr>
+              <a:buSzPts val="1900"/>
+              <a:buChar char="○"/>
+              <a:defRPr>
+                <a:solidFill>
+                  <a:srgbClr val="1C304A"/>
+                </a:solidFill>
+              </a:defRPr>
+            </a:lvl5pPr>
+            <a:lvl6pPr marL="2743200" lvl="5" indent="-323850" rtl="0">
+              <a:spcBef>
+                <a:spcPts val="3000"/>
+              </a:spcBef>
+              <a:spcAft>
+                <a:spcPts val="0"/>
+              </a:spcAft>
+              <a:buClr>
+                <a:srgbClr val="1C304A"/>
+              </a:buClr>
+              <a:buSzPts val="1500"/>
+              <a:buChar char="■"/>
+              <a:defRPr>
+                <a:solidFill>
+                  <a:srgbClr val="1C304A"/>
+                </a:solidFill>
+              </a:defRPr>
+            </a:lvl6pPr>
+            <a:lvl7pPr marL="3200400" lvl="6" indent="-323850" rtl="0">
+              <a:spcBef>
+                <a:spcPts val="3000"/>
+              </a:spcBef>
+              <a:spcAft>
+                <a:spcPts val="0"/>
+              </a:spcAft>
+              <a:buClr>
+                <a:srgbClr val="1C304A"/>
+              </a:buClr>
+              <a:buSzPts val="1500"/>
+              <a:buChar char="●"/>
+              <a:defRPr>
+                <a:solidFill>
+                  <a:srgbClr val="1C304A"/>
+                </a:solidFill>
+              </a:defRPr>
+            </a:lvl7pPr>
+            <a:lvl8pPr marL="3657600" lvl="7" indent="-323850" rtl="0">
+              <a:spcBef>
+                <a:spcPts val="3000"/>
+              </a:spcBef>
+              <a:spcAft>
+                <a:spcPts val="0"/>
+              </a:spcAft>
+              <a:buClr>
+                <a:srgbClr val="1C304A"/>
+              </a:buClr>
+              <a:buSzPts val="1500"/>
+              <a:buChar char="○"/>
+              <a:defRPr>
+                <a:solidFill>
+                  <a:srgbClr val="1C304A"/>
+                </a:solidFill>
+              </a:defRPr>
+            </a:lvl8pPr>
+            <a:lvl9pPr marL="4114800" lvl="8" indent="-323850" rtl="0">
+              <a:spcBef>
+                <a:spcPts val="3000"/>
+              </a:spcBef>
+              <a:spcAft>
+                <a:spcPts val="3000"/>
+              </a:spcAft>
+              <a:buClr>
+                <a:srgbClr val="1C304A"/>
+              </a:buClr>
+              <a:buSzPts val="1500"/>
+              <a:buChar char="■"/>
+              <a:defRPr>
+                <a:solidFill>
+                  <a:srgbClr val="1C304A"/>
+                </a:solidFill>
+              </a:defRPr>
+            </a:lvl9pPr>
+          </a:lstStyle>
+          <a:p>
+            <a:endParaRPr/>
+          </a:p>
+        </p:txBody>
+      </p:sp>
+      <p:sp>
+        <p:nvSpPr>
+          <p:cNvPr id="96" name="Google Shape;96;p22"/>
+          <p:cNvSpPr txBox="1">
+            <a:spLocks noGrp="1"/>
+          </p:cNvSpPr>
+          <p:nvPr>
+            <p:ph type="sldNum" idx="12"/>
+          </p:nvPr>
+        </p:nvSpPr>
+        <p:spPr>
+          <a:xfrm>
+            <a:off x="16066754" y="9036589"/>
+            <a:ext cx="1040400" cy="496500"/>
+          </a:xfrm>
+          <a:prstGeom prst="rect">
+            <a:avLst/>
+          </a:prstGeom>
+        </p:spPr>
+        <p:txBody>
+          <a:bodyPr spcFirstLastPara="1" wrap="square" lIns="173375" tIns="173375" rIns="173375" bIns="173375" anchor="ctr" anchorCtr="0">
+            <a:noAutofit/>
+          </a:bodyPr>
+          <a:lstStyle>
+            <a:lvl1pPr lvl="0" rtl="0">
+              <a:buNone/>
+              <a:defRPr sz="1100">
+                <a:solidFill>
+                  <a:srgbClr val="000000"/>
+                </a:solidFill>
+              </a:defRPr>
+            </a:lvl1pPr>
+            <a:lvl2pPr lvl="1" rtl="0">
+              <a:buNone/>
+              <a:defRPr sz="1100">
+                <a:solidFill>
+                  <a:srgbClr val="000000"/>
+                </a:solidFill>
+              </a:defRPr>
+            </a:lvl2pPr>
+            <a:lvl3pPr lvl="2" rtl="0">
+              <a:buNone/>
+              <a:defRPr sz="1100">
+                <a:solidFill>
+                  <a:srgbClr val="000000"/>
+                </a:solidFill>
+              </a:defRPr>
+            </a:lvl3pPr>
+            <a:lvl4pPr lvl="3" rtl="0">
+              <a:buNone/>
+              <a:defRPr sz="1100">
+                <a:solidFill>
+                  <a:srgbClr val="000000"/>
+                </a:solidFill>
+              </a:defRPr>
+            </a:lvl4pPr>
+            <a:lvl5pPr lvl="4" rtl="0">
+              <a:buNone/>
+              <a:defRPr sz="1100">
+                <a:solidFill>
+                  <a:srgbClr val="000000"/>
+                </a:solidFill>
+              </a:defRPr>
+            </a:lvl5pPr>
+            <a:lvl6pPr lvl="5" rtl="0">
+              <a:buNone/>
+              <a:defRPr sz="1100">
+                <a:solidFill>
+                  <a:srgbClr val="000000"/>
+                </a:solidFill>
+              </a:defRPr>
+            </a:lvl6pPr>
+            <a:lvl7pPr lvl="6" rtl="0">
+              <a:buNone/>
+              <a:defRPr sz="1100">
+                <a:solidFill>
+                  <a:srgbClr val="000000"/>
+                </a:solidFill>
+              </a:defRPr>
+            </a:lvl7pPr>
+            <a:lvl8pPr lvl="7" rtl="0">
+              <a:buNone/>
+              <a:defRPr sz="1100">
+                <a:solidFill>
+                  <a:srgbClr val="000000"/>
+                </a:solidFill>
+              </a:defRPr>
+            </a:lvl8pPr>
+            <a:lvl9pPr lvl="8" rtl="0">
+              <a:buNone/>
+              <a:defRPr sz="1100">
+                <a:solidFill>
+                  <a:srgbClr val="000000"/>
+                </a:solidFill>
+              </a:defRPr>
+            </a:lvl9pPr>
+          </a:lstStyle>
+          <a:p>
+            <a:pPr marL="0" lvl="0" indent="0" algn="r" rtl="0">
+              <a:spcBef>
+                <a:spcPts val="0"/>
+              </a:spcBef>
+              <a:spcAft>
+                <a:spcPts val="0"/>
+              </a:spcAft>
+              <a:buNone/>
+            </a:pPr>
+            <a:fld id="{00000000-1234-1234-1234-123412341234}" type="slidenum">
+              <a:rPr lang="en-US"/>
+              <a:t>‹#›</a:t>
+            </a:fld>
+            <a:endParaRPr/>
+          </a:p>
+        </p:txBody>
+      </p:sp>
+    </p:spTree>
+    <p:extLst>
+      <p:ext uri="{BB962C8B-B14F-4D97-AF65-F5344CB8AC3E}">
+        <p14:creationId xmlns:p14="http://schemas.microsoft.com/office/powerpoint/2010/main" val="3922980528"/>
+      </p:ext>
+    </p:extLst>
+  </p:cSld>
+  <p:clrMapOvr>
+    <a:masterClrMapping/>
+  </p:clrMapOvr>
+</p:sldLayout>
+</file>
+
 <file path=ppt/slideLayouts/slideLayout2.xml><?xml version="1.0" encoding="utf-8"?>
 <p:sldLayout xmlns:a="http://schemas.openxmlformats.org/drawingml/2006/main" xmlns:r="http://schemas.openxmlformats.org/officeDocument/2006/relationships" xmlns:p="http://schemas.openxmlformats.org/presentationml/2006/main" matchingName="Title 2 - dark" userDrawn="1">
   <p:cSld name="Title">
@@ -5490,7 +7084,7 @@
             <a:fld id="{42D41BD8-F932-40AA-8DAC-647898DB09A3}" type="datetime1">
               <a:rPr lang="en-US" smtClean="0"/>
               <a:pPr/>
-              <a:t>8/15/19</a:t>
+              <a:t>11/20/2019</a:t>
             </a:fld>
             <a:endParaRPr lang="en-US" dirty="0"/>
           </a:p>
@@ -6073,6 +7667,851 @@
 </p:sldLayout>
 </file>
 
+<file path=ppt/slideLayouts/slideLayout8.xml><?xml version="1.0" encoding="utf-8"?>
+<p:sldLayout xmlns:a="http://schemas.openxmlformats.org/drawingml/2006/main" xmlns:r="http://schemas.openxmlformats.org/officeDocument/2006/relationships" xmlns:p="http://schemas.openxmlformats.org/presentationml/2006/main" matchingName="Divider Dark Blue">
+  <p:cSld name="Divider Dark Blue">
+    <p:bg>
+      <p:bgPr>
+        <a:solidFill>
+          <a:srgbClr val="1C304A"/>
+        </a:solidFill>
+        <a:effectLst/>
+      </p:bgPr>
+    </p:bg>
+    <p:spTree>
+      <p:nvGrpSpPr>
+        <p:cNvPr id="1" name="Shape 54"/>
+        <p:cNvGrpSpPr/>
+        <p:nvPr/>
+      </p:nvGrpSpPr>
+      <p:grpSpPr>
+        <a:xfrm>
+          <a:off x="0" y="0"/>
+          <a:ext cx="0" cy="0"/>
+          <a:chOff x="0" y="0"/>
+          <a:chExt cx="0" cy="0"/>
+        </a:xfrm>
+      </p:grpSpPr>
+      <p:sp>
+        <p:nvSpPr>
+          <p:cNvPr id="55" name="Google Shape;55;p15"/>
+          <p:cNvSpPr txBox="1">
+            <a:spLocks noGrp="1"/>
+          </p:cNvSpPr>
+          <p:nvPr>
+            <p:ph type="sldNum" idx="12"/>
+          </p:nvPr>
+        </p:nvSpPr>
+        <p:spPr>
+          <a:xfrm>
+            <a:off x="16066754" y="9036589"/>
+            <a:ext cx="1040400" cy="496500"/>
+          </a:xfrm>
+          <a:prstGeom prst="rect">
+            <a:avLst/>
+          </a:prstGeom>
+        </p:spPr>
+        <p:txBody>
+          <a:bodyPr spcFirstLastPara="1" wrap="square" lIns="173375" tIns="173375" rIns="173375" bIns="173375" anchor="ctr" anchorCtr="0">
+            <a:noAutofit/>
+          </a:bodyPr>
+          <a:lstStyle>
+            <a:lvl1pPr lvl="0" rtl="0">
+              <a:buNone/>
+              <a:defRPr sz="1100">
+                <a:solidFill>
+                  <a:srgbClr val="00CFFF"/>
+                </a:solidFill>
+              </a:defRPr>
+            </a:lvl1pPr>
+            <a:lvl2pPr lvl="1" rtl="0">
+              <a:buNone/>
+              <a:defRPr sz="1100">
+                <a:solidFill>
+                  <a:srgbClr val="00CFFF"/>
+                </a:solidFill>
+              </a:defRPr>
+            </a:lvl2pPr>
+            <a:lvl3pPr lvl="2" rtl="0">
+              <a:buNone/>
+              <a:defRPr sz="1100">
+                <a:solidFill>
+                  <a:srgbClr val="00CFFF"/>
+                </a:solidFill>
+              </a:defRPr>
+            </a:lvl3pPr>
+            <a:lvl4pPr lvl="3" rtl="0">
+              <a:buNone/>
+              <a:defRPr sz="1100">
+                <a:solidFill>
+                  <a:srgbClr val="00CFFF"/>
+                </a:solidFill>
+              </a:defRPr>
+            </a:lvl4pPr>
+            <a:lvl5pPr lvl="4" rtl="0">
+              <a:buNone/>
+              <a:defRPr sz="1100">
+                <a:solidFill>
+                  <a:srgbClr val="00CFFF"/>
+                </a:solidFill>
+              </a:defRPr>
+            </a:lvl5pPr>
+            <a:lvl6pPr lvl="5" rtl="0">
+              <a:buNone/>
+              <a:defRPr sz="1100">
+                <a:solidFill>
+                  <a:srgbClr val="00CFFF"/>
+                </a:solidFill>
+              </a:defRPr>
+            </a:lvl6pPr>
+            <a:lvl7pPr lvl="6" rtl="0">
+              <a:buNone/>
+              <a:defRPr sz="1100">
+                <a:solidFill>
+                  <a:srgbClr val="00CFFF"/>
+                </a:solidFill>
+              </a:defRPr>
+            </a:lvl7pPr>
+            <a:lvl8pPr lvl="7" rtl="0">
+              <a:buNone/>
+              <a:defRPr sz="1100">
+                <a:solidFill>
+                  <a:srgbClr val="00CFFF"/>
+                </a:solidFill>
+              </a:defRPr>
+            </a:lvl8pPr>
+            <a:lvl9pPr lvl="8" rtl="0">
+              <a:buNone/>
+              <a:defRPr sz="1100">
+                <a:solidFill>
+                  <a:srgbClr val="00CFFF"/>
+                </a:solidFill>
+              </a:defRPr>
+            </a:lvl9pPr>
+          </a:lstStyle>
+          <a:p>
+            <a:pPr marL="0" lvl="0" indent="0" algn="r" rtl="0">
+              <a:spcBef>
+                <a:spcPts val="0"/>
+              </a:spcBef>
+              <a:spcAft>
+                <a:spcPts val="0"/>
+              </a:spcAft>
+              <a:buNone/>
+            </a:pPr>
+            <a:fld id="{00000000-1234-1234-1234-123412341234}" type="slidenum">
+              <a:rPr lang="en-US"/>
+              <a:t>‹#›</a:t>
+            </a:fld>
+            <a:endParaRPr/>
+          </a:p>
+        </p:txBody>
+      </p:sp>
+      <p:sp>
+        <p:nvSpPr>
+          <p:cNvPr id="56" name="Google Shape;56;p15"/>
+          <p:cNvSpPr txBox="1">
+            <a:spLocks noGrp="1"/>
+          </p:cNvSpPr>
+          <p:nvPr>
+            <p:ph type="ctrTitle"/>
+          </p:nvPr>
+        </p:nvSpPr>
+        <p:spPr>
+          <a:xfrm>
+            <a:off x="1351815" y="1016807"/>
+            <a:ext cx="14007600" cy="7078800"/>
+          </a:xfrm>
+          <a:prstGeom prst="rect">
+            <a:avLst/>
+          </a:prstGeom>
+        </p:spPr>
+        <p:txBody>
+          <a:bodyPr spcFirstLastPara="1" wrap="square" lIns="173375" tIns="173375" rIns="173375" bIns="173375" anchor="ctr" anchorCtr="0">
+            <a:noAutofit/>
+          </a:bodyPr>
+          <a:lstStyle>
+            <a:lvl1pPr lvl="0" rtl="0">
+              <a:spcBef>
+                <a:spcPts val="0"/>
+              </a:spcBef>
+              <a:spcAft>
+                <a:spcPts val="0"/>
+              </a:spcAft>
+              <a:buClr>
+                <a:srgbClr val="00CFFF"/>
+              </a:buClr>
+              <a:buSzPts val="11400"/>
+              <a:buNone/>
+              <a:defRPr sz="11400" b="1">
+                <a:solidFill>
+                  <a:srgbClr val="00CFFF"/>
+                </a:solidFill>
+              </a:defRPr>
+            </a:lvl1pPr>
+            <a:lvl2pPr lvl="1" algn="ctr" rtl="0">
+              <a:spcBef>
+                <a:spcPts val="0"/>
+              </a:spcBef>
+              <a:spcAft>
+                <a:spcPts val="0"/>
+              </a:spcAft>
+              <a:buClr>
+                <a:srgbClr val="1C304A"/>
+              </a:buClr>
+              <a:buSzPts val="11400"/>
+              <a:buNone/>
+              <a:defRPr sz="11400">
+                <a:solidFill>
+                  <a:srgbClr val="1C304A"/>
+                </a:solidFill>
+              </a:defRPr>
+            </a:lvl2pPr>
+            <a:lvl3pPr lvl="2" algn="ctr" rtl="0">
+              <a:spcBef>
+                <a:spcPts val="0"/>
+              </a:spcBef>
+              <a:spcAft>
+                <a:spcPts val="0"/>
+              </a:spcAft>
+              <a:buClr>
+                <a:srgbClr val="1C304A"/>
+              </a:buClr>
+              <a:buSzPts val="11400"/>
+              <a:buNone/>
+              <a:defRPr sz="11400">
+                <a:solidFill>
+                  <a:srgbClr val="1C304A"/>
+                </a:solidFill>
+              </a:defRPr>
+            </a:lvl3pPr>
+            <a:lvl4pPr lvl="3" algn="ctr" rtl="0">
+              <a:spcBef>
+                <a:spcPts val="0"/>
+              </a:spcBef>
+              <a:spcAft>
+                <a:spcPts val="0"/>
+              </a:spcAft>
+              <a:buClr>
+                <a:srgbClr val="1C304A"/>
+              </a:buClr>
+              <a:buSzPts val="11400"/>
+              <a:buNone/>
+              <a:defRPr sz="11400">
+                <a:solidFill>
+                  <a:srgbClr val="1C304A"/>
+                </a:solidFill>
+              </a:defRPr>
+            </a:lvl4pPr>
+            <a:lvl5pPr lvl="4" algn="ctr" rtl="0">
+              <a:spcBef>
+                <a:spcPts val="0"/>
+              </a:spcBef>
+              <a:spcAft>
+                <a:spcPts val="0"/>
+              </a:spcAft>
+              <a:buClr>
+                <a:srgbClr val="1C304A"/>
+              </a:buClr>
+              <a:buSzPts val="11400"/>
+              <a:buNone/>
+              <a:defRPr sz="11400">
+                <a:solidFill>
+                  <a:srgbClr val="1C304A"/>
+                </a:solidFill>
+              </a:defRPr>
+            </a:lvl5pPr>
+            <a:lvl6pPr lvl="5" algn="ctr" rtl="0">
+              <a:spcBef>
+                <a:spcPts val="0"/>
+              </a:spcBef>
+              <a:spcAft>
+                <a:spcPts val="0"/>
+              </a:spcAft>
+              <a:buClr>
+                <a:srgbClr val="1C304A"/>
+              </a:buClr>
+              <a:buSzPts val="11400"/>
+              <a:buNone/>
+              <a:defRPr sz="11400">
+                <a:solidFill>
+                  <a:srgbClr val="1C304A"/>
+                </a:solidFill>
+              </a:defRPr>
+            </a:lvl6pPr>
+            <a:lvl7pPr lvl="6" algn="ctr" rtl="0">
+              <a:spcBef>
+                <a:spcPts val="0"/>
+              </a:spcBef>
+              <a:spcAft>
+                <a:spcPts val="0"/>
+              </a:spcAft>
+              <a:buClr>
+                <a:srgbClr val="1C304A"/>
+              </a:buClr>
+              <a:buSzPts val="11400"/>
+              <a:buNone/>
+              <a:defRPr sz="11400">
+                <a:solidFill>
+                  <a:srgbClr val="1C304A"/>
+                </a:solidFill>
+              </a:defRPr>
+            </a:lvl7pPr>
+            <a:lvl8pPr lvl="7" algn="ctr" rtl="0">
+              <a:spcBef>
+                <a:spcPts val="0"/>
+              </a:spcBef>
+              <a:spcAft>
+                <a:spcPts val="0"/>
+              </a:spcAft>
+              <a:buClr>
+                <a:srgbClr val="1C304A"/>
+              </a:buClr>
+              <a:buSzPts val="11400"/>
+              <a:buNone/>
+              <a:defRPr sz="11400">
+                <a:solidFill>
+                  <a:srgbClr val="1C304A"/>
+                </a:solidFill>
+              </a:defRPr>
+            </a:lvl8pPr>
+            <a:lvl9pPr lvl="8" algn="ctr" rtl="0">
+              <a:spcBef>
+                <a:spcPts val="0"/>
+              </a:spcBef>
+              <a:spcAft>
+                <a:spcPts val="0"/>
+              </a:spcAft>
+              <a:buClr>
+                <a:srgbClr val="1C304A"/>
+              </a:buClr>
+              <a:buSzPts val="11400"/>
+              <a:buNone/>
+              <a:defRPr sz="11400">
+                <a:solidFill>
+                  <a:srgbClr val="1C304A"/>
+                </a:solidFill>
+              </a:defRPr>
+            </a:lvl9pPr>
+          </a:lstStyle>
+          <a:p>
+            <a:endParaRPr/>
+          </a:p>
+        </p:txBody>
+      </p:sp>
+      <p:sp>
+        <p:nvSpPr>
+          <p:cNvPr id="57" name="Google Shape;57;p15"/>
+          <p:cNvSpPr txBox="1">
+            <a:spLocks noGrp="1"/>
+          </p:cNvSpPr>
+          <p:nvPr>
+            <p:ph type="subTitle" idx="1"/>
+          </p:nvPr>
+        </p:nvSpPr>
+        <p:spPr>
+          <a:xfrm>
+            <a:off x="1414817" y="554193"/>
+            <a:ext cx="9515100" cy="1265700"/>
+          </a:xfrm>
+          <a:prstGeom prst="rect">
+            <a:avLst/>
+          </a:prstGeom>
+        </p:spPr>
+        <p:txBody>
+          <a:bodyPr spcFirstLastPara="1" wrap="square" lIns="173375" tIns="173375" rIns="173375" bIns="173375" anchor="ctr" anchorCtr="0">
+            <a:noAutofit/>
+          </a:bodyPr>
+          <a:lstStyle>
+            <a:lvl1pPr lvl="0" rtl="0">
+              <a:spcBef>
+                <a:spcPts val="0"/>
+              </a:spcBef>
+              <a:spcAft>
+                <a:spcPts val="0"/>
+              </a:spcAft>
+              <a:buNone/>
+              <a:defRPr sz="2300" b="1">
+                <a:solidFill>
+                  <a:srgbClr val="FFFFFF"/>
+                </a:solidFill>
+              </a:defRPr>
+            </a:lvl1pPr>
+            <a:lvl2pPr lvl="1" rtl="0">
+              <a:spcBef>
+                <a:spcPts val="3000"/>
+              </a:spcBef>
+              <a:spcAft>
+                <a:spcPts val="0"/>
+              </a:spcAft>
+              <a:buNone/>
+              <a:defRPr b="1"/>
+            </a:lvl2pPr>
+            <a:lvl3pPr lvl="2" rtl="0">
+              <a:spcBef>
+                <a:spcPts val="3000"/>
+              </a:spcBef>
+              <a:spcAft>
+                <a:spcPts val="0"/>
+              </a:spcAft>
+              <a:buNone/>
+              <a:defRPr b="1"/>
+            </a:lvl3pPr>
+            <a:lvl4pPr lvl="3" rtl="0">
+              <a:spcBef>
+                <a:spcPts val="3000"/>
+              </a:spcBef>
+              <a:spcAft>
+                <a:spcPts val="0"/>
+              </a:spcAft>
+              <a:buNone/>
+              <a:defRPr b="1"/>
+            </a:lvl4pPr>
+            <a:lvl5pPr lvl="4" rtl="0">
+              <a:spcBef>
+                <a:spcPts val="3000"/>
+              </a:spcBef>
+              <a:spcAft>
+                <a:spcPts val="0"/>
+              </a:spcAft>
+              <a:buNone/>
+              <a:defRPr b="1"/>
+            </a:lvl5pPr>
+            <a:lvl6pPr lvl="5" rtl="0">
+              <a:spcBef>
+                <a:spcPts val="3000"/>
+              </a:spcBef>
+              <a:spcAft>
+                <a:spcPts val="0"/>
+              </a:spcAft>
+              <a:buNone/>
+              <a:defRPr b="1"/>
+            </a:lvl6pPr>
+            <a:lvl7pPr lvl="6" rtl="0">
+              <a:spcBef>
+                <a:spcPts val="3000"/>
+              </a:spcBef>
+              <a:spcAft>
+                <a:spcPts val="0"/>
+              </a:spcAft>
+              <a:buNone/>
+              <a:defRPr b="1"/>
+            </a:lvl7pPr>
+            <a:lvl8pPr lvl="7" rtl="0">
+              <a:spcBef>
+                <a:spcPts val="3000"/>
+              </a:spcBef>
+              <a:spcAft>
+                <a:spcPts val="0"/>
+              </a:spcAft>
+              <a:buNone/>
+              <a:defRPr b="1"/>
+            </a:lvl8pPr>
+            <a:lvl9pPr lvl="8" rtl="0">
+              <a:spcBef>
+                <a:spcPts val="3000"/>
+              </a:spcBef>
+              <a:spcAft>
+                <a:spcPts val="3000"/>
+              </a:spcAft>
+              <a:buNone/>
+              <a:defRPr b="1"/>
+            </a:lvl9pPr>
+          </a:lstStyle>
+          <a:p>
+            <a:endParaRPr/>
+          </a:p>
+        </p:txBody>
+      </p:sp>
+      <p:pic>
+        <p:nvPicPr>
+          <p:cNvPr id="58" name="Google Shape;58;p15"/>
+          <p:cNvPicPr preferRelativeResize="0"/>
+          <p:nvPr/>
+        </p:nvPicPr>
+        <p:blipFill>
+          <a:blip r:embed="rId2">
+            <a:alphaModFix/>
+          </a:blip>
+          <a:stretch>
+            <a:fillRect/>
+          </a:stretch>
+        </p:blipFill>
+        <p:spPr>
+          <a:xfrm>
+            <a:off x="1565447" y="8659152"/>
+            <a:ext cx="381866" cy="381866"/>
+          </a:xfrm>
+          <a:prstGeom prst="rect">
+            <a:avLst/>
+          </a:prstGeom>
+          <a:noFill/>
+          <a:ln>
+            <a:noFill/>
+          </a:ln>
+        </p:spPr>
+      </p:pic>
+    </p:spTree>
+    <p:extLst>
+      <p:ext uri="{BB962C8B-B14F-4D97-AF65-F5344CB8AC3E}">
+        <p14:creationId xmlns:p14="http://schemas.microsoft.com/office/powerpoint/2010/main" val="4154583349"/>
+      </p:ext>
+    </p:extLst>
+  </p:cSld>
+  <p:clrMapOvr>
+    <a:masterClrMapping/>
+  </p:clrMapOvr>
+</p:sldLayout>
+</file>
+
+<file path=ppt/slideLayouts/slideLayout9.xml><?xml version="1.0" encoding="utf-8"?>
+<p:sldLayout xmlns:a="http://schemas.openxmlformats.org/drawingml/2006/main" xmlns:r="http://schemas.openxmlformats.org/officeDocument/2006/relationships" xmlns:p="http://schemas.openxmlformats.org/presentationml/2006/main" matchingName="White - LG quote">
+  <p:cSld name="White - LG quote">
+    <p:bg>
+      <p:bgPr>
+        <a:solidFill>
+          <a:srgbClr val="FFFFFF"/>
+        </a:solidFill>
+        <a:effectLst/>
+      </p:bgPr>
+    </p:bg>
+    <p:spTree>
+      <p:nvGrpSpPr>
+        <p:cNvPr id="1" name="Shape 67"/>
+        <p:cNvGrpSpPr/>
+        <p:nvPr/>
+      </p:nvGrpSpPr>
+      <p:grpSpPr>
+        <a:xfrm>
+          <a:off x="0" y="0"/>
+          <a:ext cx="0" cy="0"/>
+          <a:chOff x="0" y="0"/>
+          <a:chExt cx="0" cy="0"/>
+        </a:xfrm>
+      </p:grpSpPr>
+      <p:sp>
+        <p:nvSpPr>
+          <p:cNvPr id="68" name="Google Shape;68;p18"/>
+          <p:cNvSpPr txBox="1">
+            <a:spLocks noGrp="1"/>
+          </p:cNvSpPr>
+          <p:nvPr>
+            <p:ph type="ctrTitle"/>
+          </p:nvPr>
+        </p:nvSpPr>
+        <p:spPr>
+          <a:xfrm>
+            <a:off x="1351815" y="1016807"/>
+            <a:ext cx="14007600" cy="7078800"/>
+          </a:xfrm>
+          <a:prstGeom prst="rect">
+            <a:avLst/>
+          </a:prstGeom>
+        </p:spPr>
+        <p:txBody>
+          <a:bodyPr spcFirstLastPara="1" wrap="square" lIns="173375" tIns="173375" rIns="173375" bIns="173375" anchor="ctr" anchorCtr="0">
+            <a:noAutofit/>
+          </a:bodyPr>
+          <a:lstStyle>
+            <a:lvl1pPr lvl="0" rtl="0">
+              <a:lnSpc>
+                <a:spcPct val="100000"/>
+              </a:lnSpc>
+              <a:spcBef>
+                <a:spcPts val="0"/>
+              </a:spcBef>
+              <a:spcAft>
+                <a:spcPts val="0"/>
+              </a:spcAft>
+              <a:buClr>
+                <a:srgbClr val="1C304A"/>
+              </a:buClr>
+              <a:buSzPts val="6100"/>
+              <a:buNone/>
+              <a:defRPr sz="6100" b="1">
+                <a:solidFill>
+                  <a:srgbClr val="1C304A"/>
+                </a:solidFill>
+              </a:defRPr>
+            </a:lvl1pPr>
+            <a:lvl2pPr lvl="1" algn="ctr" rtl="0">
+              <a:spcBef>
+                <a:spcPts val="0"/>
+              </a:spcBef>
+              <a:spcAft>
+                <a:spcPts val="0"/>
+              </a:spcAft>
+              <a:buClr>
+                <a:srgbClr val="1C304A"/>
+              </a:buClr>
+              <a:buSzPts val="11400"/>
+              <a:buNone/>
+              <a:defRPr sz="11400">
+                <a:solidFill>
+                  <a:srgbClr val="1C304A"/>
+                </a:solidFill>
+              </a:defRPr>
+            </a:lvl2pPr>
+            <a:lvl3pPr lvl="2" algn="ctr" rtl="0">
+              <a:spcBef>
+                <a:spcPts val="0"/>
+              </a:spcBef>
+              <a:spcAft>
+                <a:spcPts val="0"/>
+              </a:spcAft>
+              <a:buClr>
+                <a:srgbClr val="1C304A"/>
+              </a:buClr>
+              <a:buSzPts val="11400"/>
+              <a:buNone/>
+              <a:defRPr sz="11400">
+                <a:solidFill>
+                  <a:srgbClr val="1C304A"/>
+                </a:solidFill>
+              </a:defRPr>
+            </a:lvl3pPr>
+            <a:lvl4pPr lvl="3" algn="ctr" rtl="0">
+              <a:spcBef>
+                <a:spcPts val="0"/>
+              </a:spcBef>
+              <a:spcAft>
+                <a:spcPts val="0"/>
+              </a:spcAft>
+              <a:buClr>
+                <a:srgbClr val="1C304A"/>
+              </a:buClr>
+              <a:buSzPts val="11400"/>
+              <a:buNone/>
+              <a:defRPr sz="11400">
+                <a:solidFill>
+                  <a:srgbClr val="1C304A"/>
+                </a:solidFill>
+              </a:defRPr>
+            </a:lvl4pPr>
+            <a:lvl5pPr lvl="4" algn="ctr" rtl="0">
+              <a:spcBef>
+                <a:spcPts val="0"/>
+              </a:spcBef>
+              <a:spcAft>
+                <a:spcPts val="0"/>
+              </a:spcAft>
+              <a:buClr>
+                <a:srgbClr val="1C304A"/>
+              </a:buClr>
+              <a:buSzPts val="11400"/>
+              <a:buNone/>
+              <a:defRPr sz="11400">
+                <a:solidFill>
+                  <a:srgbClr val="1C304A"/>
+                </a:solidFill>
+              </a:defRPr>
+            </a:lvl5pPr>
+            <a:lvl6pPr lvl="5" algn="ctr" rtl="0">
+              <a:spcBef>
+                <a:spcPts val="0"/>
+              </a:spcBef>
+              <a:spcAft>
+                <a:spcPts val="0"/>
+              </a:spcAft>
+              <a:buClr>
+                <a:srgbClr val="1C304A"/>
+              </a:buClr>
+              <a:buSzPts val="11400"/>
+              <a:buNone/>
+              <a:defRPr sz="11400">
+                <a:solidFill>
+                  <a:srgbClr val="1C304A"/>
+                </a:solidFill>
+              </a:defRPr>
+            </a:lvl6pPr>
+            <a:lvl7pPr lvl="6" algn="ctr" rtl="0">
+              <a:spcBef>
+                <a:spcPts val="0"/>
+              </a:spcBef>
+              <a:spcAft>
+                <a:spcPts val="0"/>
+              </a:spcAft>
+              <a:buClr>
+                <a:srgbClr val="1C304A"/>
+              </a:buClr>
+              <a:buSzPts val="11400"/>
+              <a:buNone/>
+              <a:defRPr sz="11400">
+                <a:solidFill>
+                  <a:srgbClr val="1C304A"/>
+                </a:solidFill>
+              </a:defRPr>
+            </a:lvl7pPr>
+            <a:lvl8pPr lvl="7" algn="ctr" rtl="0">
+              <a:spcBef>
+                <a:spcPts val="0"/>
+              </a:spcBef>
+              <a:spcAft>
+                <a:spcPts val="0"/>
+              </a:spcAft>
+              <a:buClr>
+                <a:srgbClr val="1C304A"/>
+              </a:buClr>
+              <a:buSzPts val="11400"/>
+              <a:buNone/>
+              <a:defRPr sz="11400">
+                <a:solidFill>
+                  <a:srgbClr val="1C304A"/>
+                </a:solidFill>
+              </a:defRPr>
+            </a:lvl8pPr>
+            <a:lvl9pPr lvl="8" algn="ctr" rtl="0">
+              <a:spcBef>
+                <a:spcPts val="0"/>
+              </a:spcBef>
+              <a:spcAft>
+                <a:spcPts val="0"/>
+              </a:spcAft>
+              <a:buClr>
+                <a:srgbClr val="1C304A"/>
+              </a:buClr>
+              <a:buSzPts val="11400"/>
+              <a:buNone/>
+              <a:defRPr sz="11400">
+                <a:solidFill>
+                  <a:srgbClr val="1C304A"/>
+                </a:solidFill>
+              </a:defRPr>
+            </a:lvl9pPr>
+          </a:lstStyle>
+          <a:p>
+            <a:endParaRPr/>
+          </a:p>
+        </p:txBody>
+      </p:sp>
+      <p:sp>
+        <p:nvSpPr>
+          <p:cNvPr id="69" name="Google Shape;69;p18"/>
+          <p:cNvSpPr txBox="1">
+            <a:spLocks noGrp="1"/>
+          </p:cNvSpPr>
+          <p:nvPr>
+            <p:ph type="sldNum" idx="12"/>
+          </p:nvPr>
+        </p:nvSpPr>
+        <p:spPr>
+          <a:xfrm>
+            <a:off x="16066754" y="9036589"/>
+            <a:ext cx="1040400" cy="496500"/>
+          </a:xfrm>
+          <a:prstGeom prst="rect">
+            <a:avLst/>
+          </a:prstGeom>
+        </p:spPr>
+        <p:txBody>
+          <a:bodyPr spcFirstLastPara="1" wrap="square" lIns="173375" tIns="173375" rIns="173375" bIns="173375" anchor="ctr" anchorCtr="0">
+            <a:noAutofit/>
+          </a:bodyPr>
+          <a:lstStyle>
+            <a:lvl1pPr lvl="0" rtl="0">
+              <a:buNone/>
+              <a:defRPr sz="1100">
+                <a:solidFill>
+                  <a:srgbClr val="000000"/>
+                </a:solidFill>
+              </a:defRPr>
+            </a:lvl1pPr>
+            <a:lvl2pPr lvl="1" rtl="0">
+              <a:buNone/>
+              <a:defRPr sz="1100">
+                <a:solidFill>
+                  <a:srgbClr val="000000"/>
+                </a:solidFill>
+              </a:defRPr>
+            </a:lvl2pPr>
+            <a:lvl3pPr lvl="2" rtl="0">
+              <a:buNone/>
+              <a:defRPr sz="1100">
+                <a:solidFill>
+                  <a:srgbClr val="000000"/>
+                </a:solidFill>
+              </a:defRPr>
+            </a:lvl3pPr>
+            <a:lvl4pPr lvl="3" rtl="0">
+              <a:buNone/>
+              <a:defRPr sz="1100">
+                <a:solidFill>
+                  <a:srgbClr val="000000"/>
+                </a:solidFill>
+              </a:defRPr>
+            </a:lvl4pPr>
+            <a:lvl5pPr lvl="4" rtl="0">
+              <a:buNone/>
+              <a:defRPr sz="1100">
+                <a:solidFill>
+                  <a:srgbClr val="000000"/>
+                </a:solidFill>
+              </a:defRPr>
+            </a:lvl5pPr>
+            <a:lvl6pPr lvl="5" rtl="0">
+              <a:buNone/>
+              <a:defRPr sz="1100">
+                <a:solidFill>
+                  <a:srgbClr val="000000"/>
+                </a:solidFill>
+              </a:defRPr>
+            </a:lvl6pPr>
+            <a:lvl7pPr lvl="6" rtl="0">
+              <a:buNone/>
+              <a:defRPr sz="1100">
+                <a:solidFill>
+                  <a:srgbClr val="000000"/>
+                </a:solidFill>
+              </a:defRPr>
+            </a:lvl7pPr>
+            <a:lvl8pPr lvl="7" rtl="0">
+              <a:buNone/>
+              <a:defRPr sz="1100">
+                <a:solidFill>
+                  <a:srgbClr val="000000"/>
+                </a:solidFill>
+              </a:defRPr>
+            </a:lvl8pPr>
+            <a:lvl9pPr lvl="8" rtl="0">
+              <a:buNone/>
+              <a:defRPr sz="1100">
+                <a:solidFill>
+                  <a:srgbClr val="000000"/>
+                </a:solidFill>
+              </a:defRPr>
+            </a:lvl9pPr>
+          </a:lstStyle>
+          <a:p>
+            <a:pPr marL="0" lvl="0" indent="0" algn="r" rtl="0">
+              <a:spcBef>
+                <a:spcPts val="0"/>
+              </a:spcBef>
+              <a:spcAft>
+                <a:spcPts val="0"/>
+              </a:spcAft>
+              <a:buNone/>
+            </a:pPr>
+            <a:fld id="{00000000-1234-1234-1234-123412341234}" type="slidenum">
+              <a:rPr lang="en-US"/>
+              <a:t>‹#›</a:t>
+            </a:fld>
+            <a:endParaRPr/>
+          </a:p>
+        </p:txBody>
+      </p:sp>
+    </p:spTree>
+    <p:extLst>
+      <p:ext uri="{BB962C8B-B14F-4D97-AF65-F5344CB8AC3E}">
+        <p14:creationId xmlns:p14="http://schemas.microsoft.com/office/powerpoint/2010/main" val="3639569603"/>
+      </p:ext>
+    </p:extLst>
+  </p:cSld>
+  <p:clrMapOvr>
+    <a:masterClrMapping/>
+  </p:clrMapOvr>
+</p:sldLayout>
+</file>
+
 <file path=ppt/slideMasters/slideMaster1.xml><?xml version="1.0" encoding="utf-8"?>
 <p:sldMaster xmlns:a="http://schemas.openxmlformats.org/drawingml/2006/main" xmlns:r="http://schemas.openxmlformats.org/officeDocument/2006/relationships" xmlns:p="http://schemas.openxmlformats.org/presentationml/2006/main">
   <p:cSld>
@@ -6379,6 +8818,9 @@
     <p:sldLayoutId id="2147483665" r:id="rId5"/>
     <p:sldLayoutId id="2147483667" r:id="rId6"/>
     <p:sldLayoutId id="2147483668" r:id="rId7"/>
+    <p:sldLayoutId id="2147483669" r:id="rId8"/>
+    <p:sldLayoutId id="2147483670" r:id="rId9"/>
+    <p:sldLayoutId id="2147483671" r:id="rId10"/>
   </p:sldLayoutIdLst>
   <p:hf hdr="0" ftr="0" dt="0"/>
   <p:txStyles>
@@ -7246,6 +9688,10 @@
               <a:rPr lang="en-US" b="1" dirty="0"/>
               <a:t>Move Forward</a:t>
             </a:r>
+            <a:r>
+              <a:rPr lang="en-US" dirty="0"/>
+              <a:t/>
+            </a:r>
             <a:br>
               <a:rPr lang="en-US" dirty="0"/>
             </a:br>
@@ -7267,6 +9713,10 @@
             <a:r>
               <a:rPr lang="en-US" b="1" dirty="0"/>
               <a:t>Does Not Move Forward</a:t>
+            </a:r>
+            <a:r>
+              <a:rPr lang="en-US" dirty="0"/>
+              <a:t/>
             </a:r>
             <a:br>
               <a:rPr lang="en-US" dirty="0"/>
@@ -8110,7 +10560,7 @@
   <p:cSld>
     <p:spTree>
       <p:nvGrpSpPr>
-        <p:cNvPr id="1" name=""/>
+        <p:cNvPr id="1" name="Shape 381"/>
         <p:cNvGrpSpPr/>
         <p:nvPr/>
       </p:nvGrpSpPr>
@@ -8124,85 +10574,100 @@
       </p:grpSpPr>
       <p:sp>
         <p:nvSpPr>
-          <p:cNvPr id="2" name="Title 1">
-            <a:extLst>
-              <a:ext uri="{FF2B5EF4-FFF2-40B4-BE49-F238E27FC236}">
-                <a16:creationId xmlns:a16="http://schemas.microsoft.com/office/drawing/2014/main" id="{7790568D-886A-194E-8BF4-C03275FA566B}"/>
-              </a:ext>
-            </a:extLst>
-          </p:cNvPr>
-          <p:cNvSpPr>
+          <p:cNvPr id="382" name="Google Shape;382;p50"/>
+          <p:cNvSpPr txBox="1">
             <a:spLocks noGrp="1"/>
           </p:cNvSpPr>
           <p:nvPr>
-            <p:ph type="title"/>
+            <p:ph type="ctrTitle"/>
           </p:nvPr>
         </p:nvSpPr>
-        <p:spPr/>
+        <p:spPr>
+          <a:xfrm>
+            <a:off x="1351815" y="1016807"/>
+            <a:ext cx="14007600" cy="7078800"/>
+          </a:xfrm>
+          <a:prstGeom prst="rect">
+            <a:avLst/>
+          </a:prstGeom>
+        </p:spPr>
         <p:txBody>
-          <a:bodyPr/>
+          <a:bodyPr spcFirstLastPara="1" wrap="square" lIns="173375" tIns="173375" rIns="173375" bIns="173375" anchor="ctr" anchorCtr="0">
+            <a:noAutofit/>
+          </a:bodyPr>
           <a:lstStyle/>
           <a:p>
+            <a:pPr marL="0" lvl="0" indent="0" algn="l" rtl="0">
+              <a:spcBef>
+                <a:spcPts val="0"/>
+              </a:spcBef>
+              <a:spcAft>
+                <a:spcPts val="0"/>
+              </a:spcAft>
+              <a:buNone/>
+            </a:pPr>
             <a:r>
-              <a:rPr lang="en-US" dirty="0"/>
-              <a:t>Everyone has Bias</a:t>
+              <a:rPr lang="en-US"/>
+              <a:t>Correcting for unconscious bias</a:t>
             </a:r>
+            <a:endParaRPr/>
           </a:p>
         </p:txBody>
       </p:sp>
       <p:sp>
         <p:nvSpPr>
-          <p:cNvPr id="3" name="Text Placeholder 2">
-            <a:extLst>
-              <a:ext uri="{FF2B5EF4-FFF2-40B4-BE49-F238E27FC236}">
-                <a16:creationId xmlns:a16="http://schemas.microsoft.com/office/drawing/2014/main" id="{9A33DBE5-BC96-1E41-8FA9-F96DCFD4DB41}"/>
-              </a:ext>
-            </a:extLst>
-          </p:cNvPr>
-          <p:cNvSpPr>
+          <p:cNvPr id="384" name="Google Shape;384;p50"/>
+          <p:cNvSpPr txBox="1">
             <a:spLocks noGrp="1"/>
           </p:cNvSpPr>
           <p:nvPr>
-            <p:ph type="body" idx="1"/>
+            <p:ph type="sldNum" idx="12"/>
           </p:nvPr>
         </p:nvSpPr>
-        <p:spPr/>
+        <p:spPr>
+          <a:xfrm>
+            <a:off x="16066754" y="9036589"/>
+            <a:ext cx="1040400" cy="496500"/>
+          </a:xfrm>
+          <a:prstGeom prst="rect">
+            <a:avLst/>
+          </a:prstGeom>
+        </p:spPr>
         <p:txBody>
-          <a:bodyPr/>
+          <a:bodyPr spcFirstLastPara="1" wrap="square" lIns="173375" tIns="173375" rIns="173375" bIns="173375" anchor="ctr" anchorCtr="0">
+            <a:noAutofit/>
+          </a:bodyPr>
           <a:lstStyle/>
           <a:p>
-            <a:r>
-              <a:rPr lang="en-US" dirty="0"/>
-              <a:t>Private sector applicants vs federal employees</a:t>
-            </a:r>
-          </a:p>
-          <a:p>
-            <a:r>
-              <a:rPr lang="en-US" dirty="0"/>
-              <a:t>Veteran applicants</a:t>
-            </a:r>
-          </a:p>
-          <a:p>
-            <a:r>
-              <a:rPr lang="en-US" dirty="0"/>
-              <a:t>Race/age/gender</a:t>
-            </a:r>
-          </a:p>
-          <a:p>
-            <a:pPr marL="171467" indent="0">
+            <a:pPr marL="0" lvl="0" indent="0" algn="r" rtl="0">
+              <a:spcBef>
+                <a:spcPts val="0"/>
+              </a:spcBef>
+              <a:spcAft>
+                <a:spcPts val="0"/>
+              </a:spcAft>
               <a:buNone/>
             </a:pPr>
-            <a:r>
-              <a:rPr lang="en-US" dirty="0"/>
-              <a:t>Be conscious of your biases and make sure you are making decisions only on the established competencies/proficiencies.</a:t>
-            </a:r>
+            <a:fld id="{00000000-1234-1234-1234-123412341234}" type="slidenum">
+              <a:rPr lang="en-US">
+                <a:solidFill>
+                  <a:srgbClr val="00CFFF"/>
+                </a:solidFill>
+              </a:rPr>
+              <a:t>18</a:t>
+            </a:fld>
+            <a:endParaRPr>
+              <a:solidFill>
+                <a:srgbClr val="00CFFF"/>
+              </a:solidFill>
+            </a:endParaRPr>
           </a:p>
         </p:txBody>
       </p:sp>
     </p:spTree>
     <p:extLst>
       <p:ext uri="{BB962C8B-B14F-4D97-AF65-F5344CB8AC3E}">
-        <p14:creationId xmlns:p14="http://schemas.microsoft.com/office/powerpoint/2010/main" val="524473694"/>
+        <p14:creationId xmlns:p14="http://schemas.microsoft.com/office/powerpoint/2010/main" val="972832998"/>
       </p:ext>
     </p:extLst>
   </p:cSld>
@@ -8217,7 +10682,7 @@
   <p:cSld>
     <p:spTree>
       <p:nvGrpSpPr>
-        <p:cNvPr id="1" name="Shape 301"/>
+        <p:cNvPr id="1" name="Shape 388"/>
         <p:cNvGrpSpPr/>
         <p:nvPr/>
       </p:nvGrpSpPr>
@@ -8231,42 +10696,99 @@
       </p:grpSpPr>
       <p:sp>
         <p:nvSpPr>
-          <p:cNvPr id="302" name="Google Shape;302;p54"/>
+          <p:cNvPr id="389" name="Google Shape;389;p51"/>
           <p:cNvSpPr txBox="1">
             <a:spLocks noGrp="1"/>
           </p:cNvSpPr>
           <p:nvPr>
-            <p:ph type="title"/>
+            <p:ph type="ctrTitle"/>
           </p:nvPr>
         </p:nvSpPr>
-        <p:spPr/>
+        <p:spPr>
+          <a:xfrm>
+            <a:off x="1351815" y="1016794"/>
+            <a:ext cx="14307300" cy="7078800"/>
+          </a:xfrm>
+          <a:prstGeom prst="rect">
+            <a:avLst/>
+          </a:prstGeom>
+        </p:spPr>
         <p:txBody>
-          <a:bodyPr/>
+          <a:bodyPr spcFirstLastPara="1" wrap="square" lIns="173375" tIns="173375" rIns="173375" bIns="173375" anchor="ctr" anchorCtr="0">
+            <a:noAutofit/>
+          </a:bodyPr>
           <a:lstStyle/>
           <a:p>
-            <a:pPr lvl="0"/>
+            <a:pPr marL="0" lvl="0" indent="0" algn="l" rtl="0">
+              <a:spcBef>
+                <a:spcPts val="0"/>
+              </a:spcBef>
+              <a:spcAft>
+                <a:spcPts val="0"/>
+              </a:spcAft>
+              <a:buNone/>
+            </a:pPr>
             <a:r>
-              <a:rPr lang="en-US" dirty="0"/>
-              <a:t>Resume Review </a:t>
+              <a:rPr lang="en-US"/>
+              <a:t>We all have biases that can have profound effects on our ability to hire the best team.</a:t>
             </a:r>
-            <a:r>
-              <a:rPr lang="en-US" b="0" dirty="0"/>
-              <a:t>Practice Session</a:t>
-            </a:r>
-            <a:br>
-              <a:rPr lang="en-US" b="0" dirty="0"/>
-            </a:br>
-            <a:br>
-              <a:rPr lang="en-US" b="0" dirty="0"/>
-            </a:br>
-            <a:r>
-              <a:rPr lang="en-US" sz="9602" dirty="0"/>
-              <a:t>60 minutes</a:t>
-            </a:r>
+            <a:endParaRPr/>
+          </a:p>
+        </p:txBody>
+      </p:sp>
+      <p:sp>
+        <p:nvSpPr>
+          <p:cNvPr id="390" name="Google Shape;390;p51"/>
+          <p:cNvSpPr txBox="1">
+            <a:spLocks noGrp="1"/>
+          </p:cNvSpPr>
+          <p:nvPr>
+            <p:ph type="sldNum" idx="12"/>
+          </p:nvPr>
+        </p:nvSpPr>
+        <p:spPr>
+          <a:xfrm>
+            <a:off x="16066754" y="9036589"/>
+            <a:ext cx="1040400" cy="496500"/>
+          </a:xfrm>
+          <a:prstGeom prst="rect">
+            <a:avLst/>
+          </a:prstGeom>
+        </p:spPr>
+        <p:txBody>
+          <a:bodyPr spcFirstLastPara="1" wrap="square" lIns="173375" tIns="173375" rIns="173375" bIns="173375" anchor="ctr" anchorCtr="0">
+            <a:noAutofit/>
+          </a:bodyPr>
+          <a:lstStyle/>
+          <a:p>
+            <a:pPr marL="0" lvl="0" indent="0" algn="r" rtl="0">
+              <a:spcBef>
+                <a:spcPts val="0"/>
+              </a:spcBef>
+              <a:spcAft>
+                <a:spcPts val="0"/>
+              </a:spcAft>
+              <a:buClr>
+                <a:srgbClr val="000000"/>
+              </a:buClr>
+              <a:buSzPts val="2100"/>
+              <a:buFont typeface="Arial"/>
+              <a:buNone/>
+            </a:pPr>
+            <a:fld id="{00000000-1234-1234-1234-123412341234}" type="slidenum">
+              <a:rPr lang="en-US"/>
+              <a:t>19</a:t>
+            </a:fld>
+            <a:endParaRPr/>
           </a:p>
         </p:txBody>
       </p:sp>
     </p:spTree>
+    <p:extLst>
+      <p:ext uri="{BB962C8B-B14F-4D97-AF65-F5344CB8AC3E}">
+        <p14:creationId xmlns:p14="http://schemas.microsoft.com/office/powerpoint/2010/main" val="3612909608"/>
+      </p:ext>
+    </p:extLst>
   </p:cSld>
   <p:clrMapOvr>
     <a:masterClrMapping/>
@@ -8345,7 +10867,9 @@
         </p:nvSpPr>
         <p:spPr/>
         <p:txBody>
-          <a:bodyPr/>
+          <a:bodyPr>
+            <a:normAutofit lnSpcReduction="10000"/>
+          </a:bodyPr>
           <a:lstStyle/>
           <a:p>
             <a:r>
@@ -8370,8 +10894,23 @@
             </a:pPr>
             <a:r>
               <a:rPr lang="en-US" dirty="0"/>
-              <a:t>Copy of competencies and proficiency levels doc that the team created out of Job Analysis Workshop</a:t>
+              <a:t>Copy of competencies and proficiency levels doc that the team created out of Job Analysis </a:t>
             </a:r>
+            <a:r>
+              <a:rPr lang="en-US" dirty="0" smtClean="0"/>
+              <a:t>Workshop</a:t>
+            </a:r>
+          </a:p>
+          <a:p>
+            <a:pPr marL="742967" indent="-571500">
+              <a:buFont typeface="Arial" panose="020B0604020202020204" pitchFamily="34" charset="0"/>
+              <a:buChar char="•"/>
+            </a:pPr>
+            <a:r>
+              <a:rPr lang="en-US" dirty="0" smtClean="0"/>
+              <a:t>Decide if your resume review with use 1-4 sentences or a different method like a competency checklist and reflect that in the slides</a:t>
+            </a:r>
+            <a:endParaRPr lang="en-US" dirty="0"/>
           </a:p>
           <a:p>
             <a:pPr marL="742967" indent="-571500">
@@ -8402,6 +10941,1482 @@
 </file>
 
 <file path=ppt/slides/slide20.xml><?xml version="1.0" encoding="utf-8"?>
+<p:sld xmlns:a="http://schemas.openxmlformats.org/drawingml/2006/main" xmlns:r="http://schemas.openxmlformats.org/officeDocument/2006/relationships" xmlns:p="http://schemas.openxmlformats.org/presentationml/2006/main">
+  <p:cSld>
+    <p:spTree>
+      <p:nvGrpSpPr>
+        <p:cNvPr id="1" name="Shape 394"/>
+        <p:cNvGrpSpPr/>
+        <p:nvPr/>
+      </p:nvGrpSpPr>
+      <p:grpSpPr>
+        <a:xfrm>
+          <a:off x="0" y="0"/>
+          <a:ext cx="0" cy="0"/>
+          <a:chOff x="0" y="0"/>
+          <a:chExt cx="0" cy="0"/>
+        </a:xfrm>
+      </p:grpSpPr>
+      <p:sp>
+        <p:nvSpPr>
+          <p:cNvPr id="395" name="Google Shape;395;p52"/>
+          <p:cNvSpPr txBox="1">
+            <a:spLocks noGrp="1"/>
+          </p:cNvSpPr>
+          <p:nvPr>
+            <p:ph type="sldNum" idx="12"/>
+          </p:nvPr>
+        </p:nvSpPr>
+        <p:spPr>
+          <a:xfrm>
+            <a:off x="16066754" y="9036589"/>
+            <a:ext cx="1040400" cy="496500"/>
+          </a:xfrm>
+          <a:prstGeom prst="rect">
+            <a:avLst/>
+          </a:prstGeom>
+        </p:spPr>
+        <p:txBody>
+          <a:bodyPr spcFirstLastPara="1" wrap="square" lIns="173375" tIns="173375" rIns="173375" bIns="173375" anchor="ctr" anchorCtr="0">
+            <a:noAutofit/>
+          </a:bodyPr>
+          <a:lstStyle/>
+          <a:p>
+            <a:pPr marL="0" lvl="0" indent="0" algn="r" rtl="0">
+              <a:spcBef>
+                <a:spcPts val="0"/>
+              </a:spcBef>
+              <a:spcAft>
+                <a:spcPts val="0"/>
+              </a:spcAft>
+              <a:buClr>
+                <a:srgbClr val="000000"/>
+              </a:buClr>
+              <a:buSzPts val="2100"/>
+              <a:buFont typeface="Arial"/>
+              <a:buNone/>
+            </a:pPr>
+            <a:fld id="{00000000-1234-1234-1234-123412341234}" type="slidenum">
+              <a:rPr lang="en-US"/>
+              <a:t>20</a:t>
+            </a:fld>
+            <a:endParaRPr/>
+          </a:p>
+        </p:txBody>
+      </p:sp>
+      <p:sp>
+        <p:nvSpPr>
+          <p:cNvPr id="396" name="Google Shape;396;p52"/>
+          <p:cNvSpPr txBox="1">
+            <a:spLocks noGrp="1"/>
+          </p:cNvSpPr>
+          <p:nvPr>
+            <p:ph type="ctrTitle"/>
+          </p:nvPr>
+        </p:nvSpPr>
+        <p:spPr>
+          <a:xfrm>
+            <a:off x="1351815" y="1016807"/>
+            <a:ext cx="14007600" cy="7078800"/>
+          </a:xfrm>
+          <a:prstGeom prst="rect">
+            <a:avLst/>
+          </a:prstGeom>
+        </p:spPr>
+        <p:txBody>
+          <a:bodyPr spcFirstLastPara="1" wrap="square" lIns="173375" tIns="173375" rIns="173375" bIns="173375" anchor="ctr" anchorCtr="0">
+            <a:noAutofit/>
+          </a:bodyPr>
+          <a:lstStyle/>
+          <a:p>
+            <a:pPr marL="0" lvl="0" indent="0" algn="l" rtl="0">
+              <a:spcBef>
+                <a:spcPts val="0"/>
+              </a:spcBef>
+              <a:spcAft>
+                <a:spcPts val="0"/>
+              </a:spcAft>
+              <a:buNone/>
+            </a:pPr>
+            <a:r>
+              <a:rPr lang="en-US" dirty="0"/>
+              <a:t>“Job applicants with white names needed to send about 10 resumes to get one callback; those with African-American names needed to send around 15 resumes to get one callback.”</a:t>
+            </a:r>
+            <a:endParaRPr dirty="0"/>
+          </a:p>
+          <a:p>
+            <a:pPr marL="0" lvl="0" indent="0" algn="r" rtl="0">
+              <a:spcBef>
+                <a:spcPts val="0"/>
+              </a:spcBef>
+              <a:spcAft>
+                <a:spcPts val="0"/>
+              </a:spcAft>
+              <a:buNone/>
+            </a:pPr>
+            <a:r>
+              <a:rPr lang="en-US" sz="2800" dirty="0" smtClean="0"/>
+              <a:t>— National Bureau of Economic Research </a:t>
+            </a:r>
+            <a:endParaRPr sz="2800" dirty="0"/>
+          </a:p>
+        </p:txBody>
+      </p:sp>
+    </p:spTree>
+    <p:extLst>
+      <p:ext uri="{BB962C8B-B14F-4D97-AF65-F5344CB8AC3E}">
+        <p14:creationId xmlns:p14="http://schemas.microsoft.com/office/powerpoint/2010/main" val="2658836164"/>
+      </p:ext>
+    </p:extLst>
+  </p:cSld>
+  <p:clrMapOvr>
+    <a:masterClrMapping/>
+  </p:clrMapOvr>
+</p:sld>
+</file>
+
+<file path=ppt/slides/slide21.xml><?xml version="1.0" encoding="utf-8"?>
+<p:sld xmlns:a="http://schemas.openxmlformats.org/drawingml/2006/main" xmlns:r="http://schemas.openxmlformats.org/officeDocument/2006/relationships" xmlns:p="http://schemas.openxmlformats.org/presentationml/2006/main">
+  <p:cSld>
+    <p:spTree>
+      <p:nvGrpSpPr>
+        <p:cNvPr id="1" name="Shape 400"/>
+        <p:cNvGrpSpPr/>
+        <p:nvPr/>
+      </p:nvGrpSpPr>
+      <p:grpSpPr>
+        <a:xfrm>
+          <a:off x="0" y="0"/>
+          <a:ext cx="0" cy="0"/>
+          <a:chOff x="0" y="0"/>
+          <a:chExt cx="0" cy="0"/>
+        </a:xfrm>
+      </p:grpSpPr>
+      <p:sp>
+        <p:nvSpPr>
+          <p:cNvPr id="401" name="Google Shape;401;p53"/>
+          <p:cNvSpPr txBox="1">
+            <a:spLocks noGrp="1"/>
+          </p:cNvSpPr>
+          <p:nvPr>
+            <p:ph type="ctrTitle"/>
+          </p:nvPr>
+        </p:nvSpPr>
+        <p:spPr>
+          <a:xfrm>
+            <a:off x="1351815" y="1016794"/>
+            <a:ext cx="14307300" cy="7078800"/>
+          </a:xfrm>
+          <a:prstGeom prst="rect">
+            <a:avLst/>
+          </a:prstGeom>
+        </p:spPr>
+        <p:txBody>
+          <a:bodyPr spcFirstLastPara="1" wrap="square" lIns="173375" tIns="173375" rIns="173375" bIns="173375" anchor="ctr" anchorCtr="0">
+            <a:noAutofit/>
+          </a:bodyPr>
+          <a:lstStyle/>
+          <a:p>
+            <a:pPr marL="0" lvl="0" indent="0" algn="l" rtl="0">
+              <a:spcBef>
+                <a:spcPts val="0"/>
+              </a:spcBef>
+              <a:spcAft>
+                <a:spcPts val="0"/>
+              </a:spcAft>
+              <a:buNone/>
+            </a:pPr>
+            <a:r>
+              <a:rPr lang="en-US"/>
+              <a:t>Unconscious bias doesn’t mean we’re bad people. All humans are biased.</a:t>
+            </a:r>
+            <a:endParaRPr/>
+          </a:p>
+        </p:txBody>
+      </p:sp>
+      <p:sp>
+        <p:nvSpPr>
+          <p:cNvPr id="402" name="Google Shape;402;p53"/>
+          <p:cNvSpPr txBox="1">
+            <a:spLocks noGrp="1"/>
+          </p:cNvSpPr>
+          <p:nvPr>
+            <p:ph type="sldNum" idx="12"/>
+          </p:nvPr>
+        </p:nvSpPr>
+        <p:spPr>
+          <a:xfrm>
+            <a:off x="16066754" y="9036589"/>
+            <a:ext cx="1040400" cy="496500"/>
+          </a:xfrm>
+          <a:prstGeom prst="rect">
+            <a:avLst/>
+          </a:prstGeom>
+        </p:spPr>
+        <p:txBody>
+          <a:bodyPr spcFirstLastPara="1" wrap="square" lIns="173375" tIns="173375" rIns="173375" bIns="173375" anchor="ctr" anchorCtr="0">
+            <a:noAutofit/>
+          </a:bodyPr>
+          <a:lstStyle/>
+          <a:p>
+            <a:pPr marL="0" lvl="0" indent="0" algn="r" rtl="0">
+              <a:spcBef>
+                <a:spcPts val="0"/>
+              </a:spcBef>
+              <a:spcAft>
+                <a:spcPts val="0"/>
+              </a:spcAft>
+              <a:buNone/>
+            </a:pPr>
+            <a:fld id="{00000000-1234-1234-1234-123412341234}" type="slidenum">
+              <a:rPr lang="en-US"/>
+              <a:t>21</a:t>
+            </a:fld>
+            <a:endParaRPr/>
+          </a:p>
+        </p:txBody>
+      </p:sp>
+    </p:spTree>
+    <p:extLst>
+      <p:ext uri="{BB962C8B-B14F-4D97-AF65-F5344CB8AC3E}">
+        <p14:creationId xmlns:p14="http://schemas.microsoft.com/office/powerpoint/2010/main" val="2251605919"/>
+      </p:ext>
+    </p:extLst>
+  </p:cSld>
+  <p:clrMapOvr>
+    <a:masterClrMapping/>
+  </p:clrMapOvr>
+</p:sld>
+</file>
+
+<file path=ppt/slides/slide22.xml><?xml version="1.0" encoding="utf-8"?>
+<p:sld xmlns:a="http://schemas.openxmlformats.org/drawingml/2006/main" xmlns:r="http://schemas.openxmlformats.org/officeDocument/2006/relationships" xmlns:p="http://schemas.openxmlformats.org/presentationml/2006/main">
+  <p:cSld>
+    <p:spTree>
+      <p:nvGrpSpPr>
+        <p:cNvPr id="1" name="Shape 406"/>
+        <p:cNvGrpSpPr/>
+        <p:nvPr/>
+      </p:nvGrpSpPr>
+      <p:grpSpPr>
+        <a:xfrm>
+          <a:off x="0" y="0"/>
+          <a:ext cx="0" cy="0"/>
+          <a:chOff x="0" y="0"/>
+          <a:chExt cx="0" cy="0"/>
+        </a:xfrm>
+      </p:grpSpPr>
+      <p:sp>
+        <p:nvSpPr>
+          <p:cNvPr id="407" name="Google Shape;407;p54"/>
+          <p:cNvSpPr txBox="1">
+            <a:spLocks noGrp="1"/>
+          </p:cNvSpPr>
+          <p:nvPr>
+            <p:ph type="ctrTitle"/>
+          </p:nvPr>
+        </p:nvSpPr>
+        <p:spPr>
+          <a:xfrm>
+            <a:off x="1351815" y="1016794"/>
+            <a:ext cx="14307300" cy="7078800"/>
+          </a:xfrm>
+          <a:prstGeom prst="rect">
+            <a:avLst/>
+          </a:prstGeom>
+        </p:spPr>
+        <p:txBody>
+          <a:bodyPr spcFirstLastPara="1" wrap="square" lIns="173375" tIns="173375" rIns="173375" bIns="173375" anchor="ctr" anchorCtr="0">
+            <a:noAutofit/>
+          </a:bodyPr>
+          <a:lstStyle/>
+          <a:p>
+            <a:pPr marL="0" lvl="0" indent="0" algn="l" rtl="0">
+              <a:spcBef>
+                <a:spcPts val="0"/>
+              </a:spcBef>
+              <a:spcAft>
+                <a:spcPts val="0"/>
+              </a:spcAft>
+              <a:buNone/>
+            </a:pPr>
+            <a:r>
+              <a:rPr lang="en-US"/>
+              <a:t>But we have to </a:t>
+            </a:r>
+            <a:r>
+              <a:rPr lang="en-US">
+                <a:solidFill>
+                  <a:srgbClr val="046B99"/>
+                </a:solidFill>
+              </a:rPr>
+              <a:t>recognize</a:t>
+            </a:r>
+            <a:r>
+              <a:rPr lang="en-US"/>
+              <a:t> our bias and </a:t>
+            </a:r>
+            <a:r>
+              <a:rPr lang="en-US">
+                <a:solidFill>
+                  <a:srgbClr val="046B99"/>
+                </a:solidFill>
+              </a:rPr>
+              <a:t>correct for it</a:t>
+            </a:r>
+            <a:r>
+              <a:rPr lang="en-US"/>
+              <a:t>.</a:t>
+            </a:r>
+            <a:endParaRPr/>
+          </a:p>
+        </p:txBody>
+      </p:sp>
+      <p:sp>
+        <p:nvSpPr>
+          <p:cNvPr id="408" name="Google Shape;408;p54"/>
+          <p:cNvSpPr txBox="1">
+            <a:spLocks noGrp="1"/>
+          </p:cNvSpPr>
+          <p:nvPr>
+            <p:ph type="sldNum" idx="12"/>
+          </p:nvPr>
+        </p:nvSpPr>
+        <p:spPr>
+          <a:xfrm>
+            <a:off x="16066754" y="9036589"/>
+            <a:ext cx="1040400" cy="496500"/>
+          </a:xfrm>
+          <a:prstGeom prst="rect">
+            <a:avLst/>
+          </a:prstGeom>
+        </p:spPr>
+        <p:txBody>
+          <a:bodyPr spcFirstLastPara="1" wrap="square" lIns="173375" tIns="173375" rIns="173375" bIns="173375" anchor="ctr" anchorCtr="0">
+            <a:noAutofit/>
+          </a:bodyPr>
+          <a:lstStyle/>
+          <a:p>
+            <a:pPr marL="0" lvl="0" indent="0" algn="r" rtl="0">
+              <a:spcBef>
+                <a:spcPts val="0"/>
+              </a:spcBef>
+              <a:spcAft>
+                <a:spcPts val="0"/>
+              </a:spcAft>
+              <a:buNone/>
+            </a:pPr>
+            <a:fld id="{00000000-1234-1234-1234-123412341234}" type="slidenum">
+              <a:rPr lang="en-US"/>
+              <a:t>22</a:t>
+            </a:fld>
+            <a:endParaRPr/>
+          </a:p>
+        </p:txBody>
+      </p:sp>
+    </p:spTree>
+    <p:extLst>
+      <p:ext uri="{BB962C8B-B14F-4D97-AF65-F5344CB8AC3E}">
+        <p14:creationId xmlns:p14="http://schemas.microsoft.com/office/powerpoint/2010/main" val="1488454862"/>
+      </p:ext>
+    </p:extLst>
+  </p:cSld>
+  <p:clrMapOvr>
+    <a:masterClrMapping/>
+  </p:clrMapOvr>
+</p:sld>
+</file>
+
+<file path=ppt/slides/slide23.xml><?xml version="1.0" encoding="utf-8"?>
+<p:sld xmlns:a="http://schemas.openxmlformats.org/drawingml/2006/main" xmlns:r="http://schemas.openxmlformats.org/officeDocument/2006/relationships" xmlns:p="http://schemas.openxmlformats.org/presentationml/2006/main">
+  <p:cSld>
+    <p:spTree>
+      <p:nvGrpSpPr>
+        <p:cNvPr id="1" name="Shape 412"/>
+        <p:cNvGrpSpPr/>
+        <p:nvPr/>
+      </p:nvGrpSpPr>
+      <p:grpSpPr>
+        <a:xfrm>
+          <a:off x="0" y="0"/>
+          <a:ext cx="0" cy="0"/>
+          <a:chOff x="0" y="0"/>
+          <a:chExt cx="0" cy="0"/>
+        </a:xfrm>
+      </p:grpSpPr>
+      <p:sp>
+        <p:nvSpPr>
+          <p:cNvPr id="413" name="Google Shape;413;p55"/>
+          <p:cNvSpPr txBox="1">
+            <a:spLocks noGrp="1"/>
+          </p:cNvSpPr>
+          <p:nvPr>
+            <p:ph type="ctrTitle"/>
+          </p:nvPr>
+        </p:nvSpPr>
+        <p:spPr>
+          <a:xfrm>
+            <a:off x="1761248" y="1098681"/>
+            <a:ext cx="15000300" cy="7078800"/>
+          </a:xfrm>
+          <a:prstGeom prst="rect">
+            <a:avLst/>
+          </a:prstGeom>
+        </p:spPr>
+        <p:txBody>
+          <a:bodyPr spcFirstLastPara="1" wrap="square" lIns="173375" tIns="173375" rIns="173375" bIns="173375" anchor="ctr" anchorCtr="0">
+            <a:noAutofit/>
+          </a:bodyPr>
+          <a:lstStyle/>
+          <a:p>
+            <a:pPr marL="0" lvl="0" indent="0" algn="l" rtl="0">
+              <a:spcBef>
+                <a:spcPts val="0"/>
+              </a:spcBef>
+              <a:spcAft>
+                <a:spcPts val="0"/>
+              </a:spcAft>
+              <a:buNone/>
+            </a:pPr>
+            <a:r>
+              <a:rPr lang="en-US" dirty="0">
+                <a:solidFill>
+                  <a:srgbClr val="046B99"/>
+                </a:solidFill>
+              </a:rPr>
+              <a:t>1</a:t>
+            </a:r>
+            <a:r>
+              <a:rPr lang="en-US" dirty="0" smtClean="0">
+                <a:solidFill>
+                  <a:srgbClr val="046B99"/>
+                </a:solidFill>
+              </a:rPr>
+              <a:t>/</a:t>
+            </a:r>
+            <a:r>
+              <a:rPr lang="en-US" dirty="0" smtClean="0"/>
+              <a:t> </a:t>
+            </a:r>
+            <a:r>
+              <a:rPr lang="en-US" dirty="0"/>
+              <a:t>Don’t look up candidates</a:t>
+            </a:r>
+            <a:endParaRPr dirty="0"/>
+          </a:p>
+          <a:p>
+            <a:pPr lvl="0"/>
+            <a:r>
+              <a:rPr lang="en-US" dirty="0" smtClean="0">
+                <a:solidFill>
+                  <a:srgbClr val="046B99"/>
+                </a:solidFill>
+              </a:rPr>
+              <a:t>2</a:t>
+            </a:r>
+            <a:r>
+              <a:rPr lang="en-US" dirty="0">
+                <a:solidFill>
+                  <a:srgbClr val="046B99"/>
+                </a:solidFill>
+              </a:rPr>
+              <a:t>/</a:t>
+            </a:r>
+            <a:r>
+              <a:rPr lang="en-US" dirty="0"/>
+              <a:t> Question your assumptions</a:t>
+            </a:r>
+            <a:br>
+              <a:rPr lang="en-US" dirty="0"/>
+            </a:br>
+            <a:r>
+              <a:rPr lang="en-US" dirty="0" smtClean="0">
+                <a:solidFill>
+                  <a:srgbClr val="046B99"/>
+                </a:solidFill>
+              </a:rPr>
+              <a:t>3/</a:t>
+            </a:r>
+            <a:r>
+              <a:rPr lang="en-US" dirty="0" smtClean="0"/>
+              <a:t> Use competencies/proficiency levels</a:t>
+            </a:r>
+            <a:endParaRPr dirty="0"/>
+          </a:p>
+          <a:p>
+            <a:pPr marL="0" lvl="0" indent="0" algn="l" rtl="0">
+              <a:spcBef>
+                <a:spcPts val="0"/>
+              </a:spcBef>
+              <a:spcAft>
+                <a:spcPts val="0"/>
+              </a:spcAft>
+              <a:buNone/>
+            </a:pPr>
+            <a:r>
+              <a:rPr lang="en-US" dirty="0">
+                <a:solidFill>
+                  <a:srgbClr val="046B99"/>
+                </a:solidFill>
+              </a:rPr>
+              <a:t>4</a:t>
+            </a:r>
+            <a:r>
+              <a:rPr lang="en-US" dirty="0" smtClean="0">
+                <a:solidFill>
+                  <a:srgbClr val="046B99"/>
+                </a:solidFill>
+              </a:rPr>
+              <a:t>/</a:t>
+            </a:r>
+            <a:r>
+              <a:rPr lang="en-US" dirty="0" smtClean="0"/>
+              <a:t> </a:t>
+            </a:r>
+            <a:r>
+              <a:rPr lang="en-US" dirty="0"/>
+              <a:t>Look at how you describe </a:t>
+            </a:r>
+            <a:r>
+              <a:rPr lang="en-US" dirty="0" smtClean="0"/>
+              <a:t>people</a:t>
+            </a:r>
+            <a:endParaRPr dirty="0"/>
+          </a:p>
+        </p:txBody>
+      </p:sp>
+      <p:sp>
+        <p:nvSpPr>
+          <p:cNvPr id="414" name="Google Shape;414;p55"/>
+          <p:cNvSpPr txBox="1">
+            <a:spLocks noGrp="1"/>
+          </p:cNvSpPr>
+          <p:nvPr>
+            <p:ph type="sldNum" idx="12"/>
+          </p:nvPr>
+        </p:nvSpPr>
+        <p:spPr>
+          <a:xfrm>
+            <a:off x="16066754" y="9036589"/>
+            <a:ext cx="1040400" cy="496500"/>
+          </a:xfrm>
+          <a:prstGeom prst="rect">
+            <a:avLst/>
+          </a:prstGeom>
+        </p:spPr>
+        <p:txBody>
+          <a:bodyPr spcFirstLastPara="1" wrap="square" lIns="173375" tIns="173375" rIns="173375" bIns="173375" anchor="ctr" anchorCtr="0">
+            <a:noAutofit/>
+          </a:bodyPr>
+          <a:lstStyle/>
+          <a:p>
+            <a:pPr marL="0" lvl="0" indent="0" algn="r" rtl="0">
+              <a:spcBef>
+                <a:spcPts val="0"/>
+              </a:spcBef>
+              <a:spcAft>
+                <a:spcPts val="0"/>
+              </a:spcAft>
+              <a:buClr>
+                <a:srgbClr val="000000"/>
+              </a:buClr>
+              <a:buSzPts val="2100"/>
+              <a:buFont typeface="Arial"/>
+              <a:buNone/>
+            </a:pPr>
+            <a:fld id="{00000000-1234-1234-1234-123412341234}" type="slidenum">
+              <a:rPr lang="en-US"/>
+              <a:t>23</a:t>
+            </a:fld>
+            <a:endParaRPr/>
+          </a:p>
+        </p:txBody>
+      </p:sp>
+    </p:spTree>
+    <p:extLst>
+      <p:ext uri="{BB962C8B-B14F-4D97-AF65-F5344CB8AC3E}">
+        <p14:creationId xmlns:p14="http://schemas.microsoft.com/office/powerpoint/2010/main" val="3095054550"/>
+      </p:ext>
+    </p:extLst>
+  </p:cSld>
+  <p:clrMapOvr>
+    <a:masterClrMapping/>
+  </p:clrMapOvr>
+</p:sld>
+</file>
+
+<file path=ppt/slides/slide24.xml><?xml version="1.0" encoding="utf-8"?>
+<p:sld xmlns:a="http://schemas.openxmlformats.org/drawingml/2006/main" xmlns:r="http://schemas.openxmlformats.org/officeDocument/2006/relationships" xmlns:p="http://schemas.openxmlformats.org/presentationml/2006/main">
+  <p:cSld>
+    <p:spTree>
+      <p:nvGrpSpPr>
+        <p:cNvPr id="1" name="Shape 418"/>
+        <p:cNvGrpSpPr/>
+        <p:nvPr/>
+      </p:nvGrpSpPr>
+      <p:grpSpPr>
+        <a:xfrm>
+          <a:off x="0" y="0"/>
+          <a:ext cx="0" cy="0"/>
+          <a:chOff x="0" y="0"/>
+          <a:chExt cx="0" cy="0"/>
+        </a:xfrm>
+      </p:grpSpPr>
+      <p:sp>
+        <p:nvSpPr>
+          <p:cNvPr id="419" name="Google Shape;419;p56"/>
+          <p:cNvSpPr txBox="1">
+            <a:spLocks noGrp="1"/>
+          </p:cNvSpPr>
+          <p:nvPr>
+            <p:ph type="ctrTitle"/>
+          </p:nvPr>
+        </p:nvSpPr>
+        <p:spPr>
+          <a:xfrm>
+            <a:off x="1351815" y="548792"/>
+            <a:ext cx="14007600" cy="1600800"/>
+          </a:xfrm>
+          <a:prstGeom prst="rect">
+            <a:avLst/>
+          </a:prstGeom>
+        </p:spPr>
+        <p:txBody>
+          <a:bodyPr spcFirstLastPara="1" wrap="square" lIns="173375" tIns="173375" rIns="173375" bIns="173375" anchor="t" anchorCtr="0">
+            <a:noAutofit/>
+          </a:bodyPr>
+          <a:lstStyle/>
+          <a:p>
+            <a:pPr marL="0" lvl="0" indent="0" algn="l" rtl="0">
+              <a:spcBef>
+                <a:spcPts val="0"/>
+              </a:spcBef>
+              <a:spcAft>
+                <a:spcPts val="0"/>
+              </a:spcAft>
+              <a:buNone/>
+            </a:pPr>
+            <a:r>
+              <a:rPr lang="en-US" dirty="0">
+                <a:solidFill>
+                  <a:srgbClr val="1C304A"/>
+                </a:solidFill>
+              </a:rPr>
+              <a:t>1</a:t>
+            </a:r>
+            <a:r>
+              <a:rPr lang="en-US" dirty="0" smtClean="0">
+                <a:solidFill>
+                  <a:srgbClr val="1C304A"/>
+                </a:solidFill>
+              </a:rPr>
+              <a:t>/</a:t>
+            </a:r>
+            <a:r>
+              <a:rPr lang="en-US" dirty="0" smtClean="0"/>
+              <a:t> </a:t>
+            </a:r>
+            <a:r>
+              <a:rPr lang="en-US" dirty="0"/>
+              <a:t>Don’t look up candidates</a:t>
+            </a:r>
+            <a:endParaRPr dirty="0"/>
+          </a:p>
+        </p:txBody>
+      </p:sp>
+      <p:sp>
+        <p:nvSpPr>
+          <p:cNvPr id="420" name="Google Shape;420;p56"/>
+          <p:cNvSpPr txBox="1">
+            <a:spLocks noGrp="1"/>
+          </p:cNvSpPr>
+          <p:nvPr>
+            <p:ph type="body" idx="1"/>
+          </p:nvPr>
+        </p:nvSpPr>
+        <p:spPr>
+          <a:xfrm>
+            <a:off x="1182186" y="3152357"/>
+            <a:ext cx="14965200" cy="6478500"/>
+          </a:xfrm>
+          <a:prstGeom prst="rect">
+            <a:avLst/>
+          </a:prstGeom>
+        </p:spPr>
+        <p:txBody>
+          <a:bodyPr spcFirstLastPara="1" wrap="square" lIns="173375" tIns="173375" rIns="173375" bIns="173375" anchor="t" anchorCtr="0">
+            <a:noAutofit/>
+          </a:bodyPr>
+          <a:lstStyle/>
+          <a:p>
+            <a:pPr marL="0" lvl="0" indent="0" algn="l" rtl="0">
+              <a:spcBef>
+                <a:spcPts val="0"/>
+              </a:spcBef>
+              <a:spcAft>
+                <a:spcPts val="0"/>
+              </a:spcAft>
+              <a:buNone/>
+            </a:pPr>
+            <a:r>
+              <a:rPr lang="en-US" dirty="0"/>
+              <a:t>Looking at a candidate’s internet presence can lead you to make conclusions about them before you even meet them! </a:t>
+            </a:r>
+            <a:endParaRPr dirty="0"/>
+          </a:p>
+          <a:p>
+            <a:pPr marL="0" lvl="0" indent="0" algn="l" rtl="0">
+              <a:spcBef>
+                <a:spcPts val="3000"/>
+              </a:spcBef>
+              <a:spcAft>
+                <a:spcPts val="3000"/>
+              </a:spcAft>
+              <a:buNone/>
+            </a:pPr>
+            <a:r>
+              <a:rPr lang="en-US" dirty="0"/>
+              <a:t>Don’t search for candidates online. Instead, use the application materials </a:t>
+            </a:r>
+            <a:r>
+              <a:rPr lang="en-US" dirty="0" smtClean="0"/>
+              <a:t>provided. </a:t>
+            </a:r>
+            <a:endParaRPr dirty="0"/>
+          </a:p>
+        </p:txBody>
+      </p:sp>
+      <p:sp>
+        <p:nvSpPr>
+          <p:cNvPr id="421" name="Google Shape;421;p56"/>
+          <p:cNvSpPr txBox="1">
+            <a:spLocks noGrp="1"/>
+          </p:cNvSpPr>
+          <p:nvPr>
+            <p:ph type="sldNum" idx="12"/>
+          </p:nvPr>
+        </p:nvSpPr>
+        <p:spPr>
+          <a:xfrm>
+            <a:off x="16066754" y="9036589"/>
+            <a:ext cx="1040400" cy="496500"/>
+          </a:xfrm>
+          <a:prstGeom prst="rect">
+            <a:avLst/>
+          </a:prstGeom>
+        </p:spPr>
+        <p:txBody>
+          <a:bodyPr spcFirstLastPara="1" wrap="square" lIns="173375" tIns="173375" rIns="173375" bIns="173375" anchor="ctr" anchorCtr="0">
+            <a:noAutofit/>
+          </a:bodyPr>
+          <a:lstStyle/>
+          <a:p>
+            <a:pPr marL="0" lvl="0" indent="0" algn="r" rtl="0">
+              <a:spcBef>
+                <a:spcPts val="0"/>
+              </a:spcBef>
+              <a:spcAft>
+                <a:spcPts val="0"/>
+              </a:spcAft>
+              <a:buClr>
+                <a:srgbClr val="000000"/>
+              </a:buClr>
+              <a:buSzPts val="2100"/>
+              <a:buFont typeface="Arial"/>
+              <a:buNone/>
+            </a:pPr>
+            <a:fld id="{00000000-1234-1234-1234-123412341234}" type="slidenum">
+              <a:rPr lang="en-US"/>
+              <a:t>24</a:t>
+            </a:fld>
+            <a:endParaRPr/>
+          </a:p>
+        </p:txBody>
+      </p:sp>
+    </p:spTree>
+    <p:extLst>
+      <p:ext uri="{BB962C8B-B14F-4D97-AF65-F5344CB8AC3E}">
+        <p14:creationId xmlns:p14="http://schemas.microsoft.com/office/powerpoint/2010/main" val="1278737179"/>
+      </p:ext>
+    </p:extLst>
+  </p:cSld>
+  <p:clrMapOvr>
+    <a:masterClrMapping/>
+  </p:clrMapOvr>
+</p:sld>
+</file>
+
+<file path=ppt/slides/slide25.xml><?xml version="1.0" encoding="utf-8"?>
+<p:sld xmlns:a="http://schemas.openxmlformats.org/drawingml/2006/main" xmlns:r="http://schemas.openxmlformats.org/officeDocument/2006/relationships" xmlns:p="http://schemas.openxmlformats.org/presentationml/2006/main">
+  <p:cSld>
+    <p:spTree>
+      <p:nvGrpSpPr>
+        <p:cNvPr id="1" name="Shape 432"/>
+        <p:cNvGrpSpPr/>
+        <p:nvPr/>
+      </p:nvGrpSpPr>
+      <p:grpSpPr>
+        <a:xfrm>
+          <a:off x="0" y="0"/>
+          <a:ext cx="0" cy="0"/>
+          <a:chOff x="0" y="0"/>
+          <a:chExt cx="0" cy="0"/>
+        </a:xfrm>
+      </p:grpSpPr>
+      <p:sp>
+        <p:nvSpPr>
+          <p:cNvPr id="433" name="Google Shape;433;p58"/>
+          <p:cNvSpPr txBox="1">
+            <a:spLocks noGrp="1"/>
+          </p:cNvSpPr>
+          <p:nvPr>
+            <p:ph type="ctrTitle"/>
+          </p:nvPr>
+        </p:nvSpPr>
+        <p:spPr>
+          <a:xfrm>
+            <a:off x="1351815" y="548792"/>
+            <a:ext cx="14007600" cy="1600800"/>
+          </a:xfrm>
+          <a:prstGeom prst="rect">
+            <a:avLst/>
+          </a:prstGeom>
+        </p:spPr>
+        <p:txBody>
+          <a:bodyPr spcFirstLastPara="1" wrap="square" lIns="173375" tIns="173375" rIns="173375" bIns="173375" anchor="t" anchorCtr="0">
+            <a:noAutofit/>
+          </a:bodyPr>
+          <a:lstStyle/>
+          <a:p>
+            <a:pPr marL="0" lvl="0" indent="0" algn="l" rtl="0">
+              <a:spcBef>
+                <a:spcPts val="0"/>
+              </a:spcBef>
+              <a:spcAft>
+                <a:spcPts val="0"/>
+              </a:spcAft>
+              <a:buNone/>
+            </a:pPr>
+            <a:r>
+              <a:rPr lang="en-US" dirty="0">
+                <a:solidFill>
+                  <a:srgbClr val="1C304A"/>
+                </a:solidFill>
+              </a:rPr>
+              <a:t>2</a:t>
+            </a:r>
+            <a:r>
+              <a:rPr lang="en-US" dirty="0" smtClean="0">
+                <a:solidFill>
+                  <a:srgbClr val="1C304A"/>
+                </a:solidFill>
+              </a:rPr>
+              <a:t>/</a:t>
+            </a:r>
+            <a:r>
+              <a:rPr lang="en-US" dirty="0" smtClean="0"/>
+              <a:t> </a:t>
+            </a:r>
+            <a:r>
+              <a:rPr lang="en-US" dirty="0"/>
+              <a:t>Question your assumptions</a:t>
+            </a:r>
+            <a:endParaRPr dirty="0"/>
+          </a:p>
+        </p:txBody>
+      </p:sp>
+      <p:sp>
+        <p:nvSpPr>
+          <p:cNvPr id="434" name="Google Shape;434;p58"/>
+          <p:cNvSpPr txBox="1">
+            <a:spLocks noGrp="1"/>
+          </p:cNvSpPr>
+          <p:nvPr>
+            <p:ph type="body" idx="1"/>
+          </p:nvPr>
+        </p:nvSpPr>
+        <p:spPr>
+          <a:xfrm>
+            <a:off x="1182186" y="3152357"/>
+            <a:ext cx="14965200" cy="6478500"/>
+          </a:xfrm>
+          <a:prstGeom prst="rect">
+            <a:avLst/>
+          </a:prstGeom>
+        </p:spPr>
+        <p:txBody>
+          <a:bodyPr spcFirstLastPara="1" wrap="square" lIns="173375" tIns="173375" rIns="173375" bIns="173375" anchor="t" anchorCtr="0">
+            <a:noAutofit/>
+          </a:bodyPr>
+          <a:lstStyle/>
+          <a:p>
+            <a:pPr marL="0" lvl="0" indent="0" algn="l" rtl="0">
+              <a:spcBef>
+                <a:spcPts val="0"/>
+              </a:spcBef>
+              <a:spcAft>
+                <a:spcPts val="0"/>
+              </a:spcAft>
+              <a:buNone/>
+            </a:pPr>
+            <a:r>
+              <a:rPr lang="en-US"/>
+              <a:t>Society has taught us to assume that certain people (like women, people of color, people with disabilities, etc.) are less capable than others. When considering candidates from under-estimated backgrounds, check your thinking about qualification.</a:t>
+            </a:r>
+            <a:endParaRPr/>
+          </a:p>
+          <a:p>
+            <a:pPr marL="0" lvl="0" indent="0" algn="l" rtl="0">
+              <a:spcBef>
+                <a:spcPts val="3000"/>
+              </a:spcBef>
+              <a:spcAft>
+                <a:spcPts val="3000"/>
+              </a:spcAft>
+              <a:buNone/>
+            </a:pPr>
+            <a:r>
+              <a:rPr lang="en-US"/>
+              <a:t>Ask yourself: am I reading this person's qualifications the same as if they were white, male, etc?</a:t>
+            </a:r>
+            <a:endParaRPr/>
+          </a:p>
+        </p:txBody>
+      </p:sp>
+      <p:sp>
+        <p:nvSpPr>
+          <p:cNvPr id="435" name="Google Shape;435;p58"/>
+          <p:cNvSpPr txBox="1">
+            <a:spLocks noGrp="1"/>
+          </p:cNvSpPr>
+          <p:nvPr>
+            <p:ph type="sldNum" idx="12"/>
+          </p:nvPr>
+        </p:nvSpPr>
+        <p:spPr>
+          <a:xfrm>
+            <a:off x="16066754" y="9036589"/>
+            <a:ext cx="1040400" cy="496500"/>
+          </a:xfrm>
+          <a:prstGeom prst="rect">
+            <a:avLst/>
+          </a:prstGeom>
+        </p:spPr>
+        <p:txBody>
+          <a:bodyPr spcFirstLastPara="1" wrap="square" lIns="173375" tIns="173375" rIns="173375" bIns="173375" anchor="ctr" anchorCtr="0">
+            <a:noAutofit/>
+          </a:bodyPr>
+          <a:lstStyle/>
+          <a:p>
+            <a:pPr marL="0" lvl="0" indent="0" algn="r" rtl="0">
+              <a:spcBef>
+                <a:spcPts val="0"/>
+              </a:spcBef>
+              <a:spcAft>
+                <a:spcPts val="0"/>
+              </a:spcAft>
+              <a:buNone/>
+            </a:pPr>
+            <a:fld id="{00000000-1234-1234-1234-123412341234}" type="slidenum">
+              <a:rPr lang="en-US"/>
+              <a:t>25</a:t>
+            </a:fld>
+            <a:endParaRPr/>
+          </a:p>
+        </p:txBody>
+      </p:sp>
+    </p:spTree>
+    <p:extLst>
+      <p:ext uri="{BB962C8B-B14F-4D97-AF65-F5344CB8AC3E}">
+        <p14:creationId xmlns:p14="http://schemas.microsoft.com/office/powerpoint/2010/main" val="2221470455"/>
+      </p:ext>
+    </p:extLst>
+  </p:cSld>
+  <p:clrMapOvr>
+    <a:masterClrMapping/>
+  </p:clrMapOvr>
+</p:sld>
+</file>
+
+<file path=ppt/slides/slide26.xml><?xml version="1.0" encoding="utf-8"?>
+<p:sld xmlns:a="http://schemas.openxmlformats.org/drawingml/2006/main" xmlns:r="http://schemas.openxmlformats.org/officeDocument/2006/relationships" xmlns:p="http://schemas.openxmlformats.org/presentationml/2006/main">
+  <p:cSld>
+    <p:spTree>
+      <p:nvGrpSpPr>
+        <p:cNvPr id="1" name="Shape 439"/>
+        <p:cNvGrpSpPr/>
+        <p:nvPr/>
+      </p:nvGrpSpPr>
+      <p:grpSpPr>
+        <a:xfrm>
+          <a:off x="0" y="0"/>
+          <a:ext cx="0" cy="0"/>
+          <a:chOff x="0" y="0"/>
+          <a:chExt cx="0" cy="0"/>
+        </a:xfrm>
+      </p:grpSpPr>
+      <p:sp>
+        <p:nvSpPr>
+          <p:cNvPr id="440" name="Google Shape;440;p59"/>
+          <p:cNvSpPr txBox="1">
+            <a:spLocks noGrp="1"/>
+          </p:cNvSpPr>
+          <p:nvPr>
+            <p:ph type="ctrTitle"/>
+          </p:nvPr>
+        </p:nvSpPr>
+        <p:spPr>
+          <a:xfrm>
+            <a:off x="1351815" y="548792"/>
+            <a:ext cx="14007600" cy="1600800"/>
+          </a:xfrm>
+          <a:prstGeom prst="rect">
+            <a:avLst/>
+          </a:prstGeom>
+        </p:spPr>
+        <p:txBody>
+          <a:bodyPr spcFirstLastPara="1" wrap="square" lIns="173375" tIns="173375" rIns="173375" bIns="173375" anchor="t" anchorCtr="0">
+            <a:noAutofit/>
+          </a:bodyPr>
+          <a:lstStyle/>
+          <a:p>
+            <a:pPr marL="0" lvl="0" indent="0" algn="l" rtl="0">
+              <a:spcBef>
+                <a:spcPts val="0"/>
+              </a:spcBef>
+              <a:spcAft>
+                <a:spcPts val="0"/>
+              </a:spcAft>
+              <a:buNone/>
+            </a:pPr>
+            <a:r>
+              <a:rPr lang="en-US" dirty="0">
+                <a:solidFill>
+                  <a:srgbClr val="1C304A"/>
+                </a:solidFill>
+              </a:rPr>
+              <a:t>3</a:t>
+            </a:r>
+            <a:r>
+              <a:rPr lang="en-US" dirty="0" smtClean="0">
+                <a:solidFill>
+                  <a:srgbClr val="1C304A"/>
+                </a:solidFill>
+              </a:rPr>
+              <a:t>/</a:t>
+            </a:r>
+            <a:r>
+              <a:rPr lang="en-US" dirty="0" smtClean="0"/>
+              <a:t> </a:t>
+            </a:r>
+            <a:r>
+              <a:rPr lang="en-US" dirty="0"/>
+              <a:t>Use the </a:t>
+            </a:r>
+            <a:r>
+              <a:rPr lang="en-US" dirty="0" smtClean="0"/>
+              <a:t>competencies and proficiency levels</a:t>
+            </a:r>
+            <a:endParaRPr dirty="0"/>
+          </a:p>
+        </p:txBody>
+      </p:sp>
+      <p:sp>
+        <p:nvSpPr>
+          <p:cNvPr id="441" name="Google Shape;441;p59"/>
+          <p:cNvSpPr txBox="1">
+            <a:spLocks noGrp="1"/>
+          </p:cNvSpPr>
+          <p:nvPr>
+            <p:ph type="body" idx="1"/>
+          </p:nvPr>
+        </p:nvSpPr>
+        <p:spPr>
+          <a:xfrm>
+            <a:off x="1182186" y="3152357"/>
+            <a:ext cx="14965200" cy="6478500"/>
+          </a:xfrm>
+          <a:prstGeom prst="rect">
+            <a:avLst/>
+          </a:prstGeom>
+        </p:spPr>
+        <p:txBody>
+          <a:bodyPr spcFirstLastPara="1" wrap="square" lIns="173375" tIns="173375" rIns="173375" bIns="173375" anchor="t" anchorCtr="0">
+            <a:noAutofit/>
+          </a:bodyPr>
+          <a:lstStyle/>
+          <a:p>
+            <a:pPr marL="0" lvl="0" indent="0" algn="l" rtl="0">
+              <a:spcBef>
+                <a:spcPts val="0"/>
+              </a:spcBef>
+              <a:spcAft>
+                <a:spcPts val="0"/>
+              </a:spcAft>
+              <a:buNone/>
+            </a:pPr>
+            <a:r>
+              <a:rPr lang="en-US" dirty="0"/>
+              <a:t>Using the guides consistently helps us assess candidates more fairly, because we’ve had time to write down what we’re looking for in an answer </a:t>
+            </a:r>
+            <a:r>
+              <a:rPr lang="en-US" i="1" dirty="0"/>
+              <a:t>before</a:t>
+            </a:r>
+            <a:r>
+              <a:rPr lang="en-US" dirty="0"/>
+              <a:t> we look at their application. That means that the bar we’re holding a candidate to isn’t a moving target based on our perception of them.</a:t>
+            </a:r>
+            <a:endParaRPr dirty="0"/>
+          </a:p>
+          <a:p>
+            <a:pPr marL="0" lvl="0" indent="0" algn="l" rtl="0">
+              <a:spcBef>
+                <a:spcPts val="3000"/>
+              </a:spcBef>
+              <a:spcAft>
+                <a:spcPts val="0"/>
+              </a:spcAft>
+              <a:buNone/>
+            </a:pPr>
+            <a:r>
+              <a:rPr lang="en-US" dirty="0"/>
+              <a:t>Make sure to double check your reviews against </a:t>
+            </a:r>
+            <a:r>
+              <a:rPr lang="en-US" dirty="0" smtClean="0"/>
+              <a:t>the pre-established qualifications.</a:t>
+            </a:r>
+            <a:endParaRPr dirty="0"/>
+          </a:p>
+          <a:p>
+            <a:pPr marL="0" lvl="0" indent="0" algn="l" rtl="0">
+              <a:spcBef>
+                <a:spcPts val="3000"/>
+              </a:spcBef>
+              <a:spcAft>
+                <a:spcPts val="3000"/>
+              </a:spcAft>
+              <a:buNone/>
+            </a:pPr>
+            <a:endParaRPr sz="2300" dirty="0"/>
+          </a:p>
+        </p:txBody>
+      </p:sp>
+      <p:sp>
+        <p:nvSpPr>
+          <p:cNvPr id="442" name="Google Shape;442;p59"/>
+          <p:cNvSpPr txBox="1">
+            <a:spLocks noGrp="1"/>
+          </p:cNvSpPr>
+          <p:nvPr>
+            <p:ph type="sldNum" idx="12"/>
+          </p:nvPr>
+        </p:nvSpPr>
+        <p:spPr>
+          <a:xfrm>
+            <a:off x="16066754" y="9036589"/>
+            <a:ext cx="1040400" cy="496500"/>
+          </a:xfrm>
+          <a:prstGeom prst="rect">
+            <a:avLst/>
+          </a:prstGeom>
+        </p:spPr>
+        <p:txBody>
+          <a:bodyPr spcFirstLastPara="1" wrap="square" lIns="173375" tIns="173375" rIns="173375" bIns="173375" anchor="ctr" anchorCtr="0">
+            <a:noAutofit/>
+          </a:bodyPr>
+          <a:lstStyle/>
+          <a:p>
+            <a:pPr marL="0" lvl="0" indent="0" algn="r" rtl="0">
+              <a:spcBef>
+                <a:spcPts val="0"/>
+              </a:spcBef>
+              <a:spcAft>
+                <a:spcPts val="0"/>
+              </a:spcAft>
+              <a:buNone/>
+            </a:pPr>
+            <a:fld id="{00000000-1234-1234-1234-123412341234}" type="slidenum">
+              <a:rPr lang="en-US"/>
+              <a:t>26</a:t>
+            </a:fld>
+            <a:endParaRPr/>
+          </a:p>
+        </p:txBody>
+      </p:sp>
+    </p:spTree>
+    <p:extLst>
+      <p:ext uri="{BB962C8B-B14F-4D97-AF65-F5344CB8AC3E}">
+        <p14:creationId xmlns:p14="http://schemas.microsoft.com/office/powerpoint/2010/main" val="1854196778"/>
+      </p:ext>
+    </p:extLst>
+  </p:cSld>
+  <p:clrMapOvr>
+    <a:masterClrMapping/>
+  </p:clrMapOvr>
+</p:sld>
+</file>
+
+<file path=ppt/slides/slide27.xml><?xml version="1.0" encoding="utf-8"?>
+<p:sld xmlns:a="http://schemas.openxmlformats.org/drawingml/2006/main" xmlns:r="http://schemas.openxmlformats.org/officeDocument/2006/relationships" xmlns:p="http://schemas.openxmlformats.org/presentationml/2006/main">
+  <p:cSld>
+    <p:spTree>
+      <p:nvGrpSpPr>
+        <p:cNvPr id="1" name="Shape 446"/>
+        <p:cNvGrpSpPr/>
+        <p:nvPr/>
+      </p:nvGrpSpPr>
+      <p:grpSpPr>
+        <a:xfrm>
+          <a:off x="0" y="0"/>
+          <a:ext cx="0" cy="0"/>
+          <a:chOff x="0" y="0"/>
+          <a:chExt cx="0" cy="0"/>
+        </a:xfrm>
+      </p:grpSpPr>
+      <p:sp>
+        <p:nvSpPr>
+          <p:cNvPr id="447" name="Google Shape;447;p60"/>
+          <p:cNvSpPr txBox="1">
+            <a:spLocks noGrp="1"/>
+          </p:cNvSpPr>
+          <p:nvPr>
+            <p:ph type="ctrTitle"/>
+          </p:nvPr>
+        </p:nvSpPr>
+        <p:spPr>
+          <a:xfrm>
+            <a:off x="1351815" y="548792"/>
+            <a:ext cx="14007600" cy="1600800"/>
+          </a:xfrm>
+          <a:prstGeom prst="rect">
+            <a:avLst/>
+          </a:prstGeom>
+        </p:spPr>
+        <p:txBody>
+          <a:bodyPr spcFirstLastPara="1" wrap="square" lIns="173375" tIns="173375" rIns="173375" bIns="173375" anchor="t" anchorCtr="0">
+            <a:noAutofit/>
+          </a:bodyPr>
+          <a:lstStyle/>
+          <a:p>
+            <a:pPr marL="0" lvl="0" indent="0" algn="l" rtl="0">
+              <a:spcBef>
+                <a:spcPts val="0"/>
+              </a:spcBef>
+              <a:spcAft>
+                <a:spcPts val="0"/>
+              </a:spcAft>
+              <a:buNone/>
+            </a:pPr>
+            <a:r>
+              <a:rPr lang="en-US" dirty="0" smtClean="0">
+                <a:solidFill>
+                  <a:srgbClr val="1C304A"/>
+                </a:solidFill>
+              </a:rPr>
+              <a:t>3/</a:t>
+            </a:r>
+            <a:r>
+              <a:rPr lang="en-US" dirty="0" smtClean="0"/>
+              <a:t> </a:t>
+            </a:r>
+            <a:r>
+              <a:rPr lang="en-US" dirty="0"/>
+              <a:t>Look at how you describe people</a:t>
+            </a:r>
+            <a:endParaRPr dirty="0"/>
+          </a:p>
+        </p:txBody>
+      </p:sp>
+      <p:sp>
+        <p:nvSpPr>
+          <p:cNvPr id="448" name="Google Shape;448;p60"/>
+          <p:cNvSpPr txBox="1">
+            <a:spLocks noGrp="1"/>
+          </p:cNvSpPr>
+          <p:nvPr>
+            <p:ph type="sldNum" idx="12"/>
+          </p:nvPr>
+        </p:nvSpPr>
+        <p:spPr>
+          <a:xfrm>
+            <a:off x="16066754" y="9036589"/>
+            <a:ext cx="1040400" cy="496500"/>
+          </a:xfrm>
+          <a:prstGeom prst="rect">
+            <a:avLst/>
+          </a:prstGeom>
+        </p:spPr>
+        <p:txBody>
+          <a:bodyPr spcFirstLastPara="1" wrap="square" lIns="173375" tIns="173375" rIns="173375" bIns="173375" anchor="ctr" anchorCtr="0">
+            <a:noAutofit/>
+          </a:bodyPr>
+          <a:lstStyle/>
+          <a:p>
+            <a:pPr marL="0" lvl="0" indent="0" algn="r" rtl="0">
+              <a:spcBef>
+                <a:spcPts val="0"/>
+              </a:spcBef>
+              <a:spcAft>
+                <a:spcPts val="0"/>
+              </a:spcAft>
+              <a:buNone/>
+            </a:pPr>
+            <a:fld id="{00000000-1234-1234-1234-123412341234}" type="slidenum">
+              <a:rPr lang="en-US"/>
+              <a:t>27</a:t>
+            </a:fld>
+            <a:endParaRPr/>
+          </a:p>
+        </p:txBody>
+      </p:sp>
+      <p:sp>
+        <p:nvSpPr>
+          <p:cNvPr id="449" name="Google Shape;449;p60"/>
+          <p:cNvSpPr txBox="1">
+            <a:spLocks noGrp="1"/>
+          </p:cNvSpPr>
+          <p:nvPr>
+            <p:ph type="body" idx="1"/>
+          </p:nvPr>
+        </p:nvSpPr>
+        <p:spPr>
+          <a:xfrm>
+            <a:off x="1182186" y="3152357"/>
+            <a:ext cx="14965200" cy="6478500"/>
+          </a:xfrm>
+          <a:prstGeom prst="rect">
+            <a:avLst/>
+          </a:prstGeom>
+        </p:spPr>
+        <p:txBody>
+          <a:bodyPr spcFirstLastPara="1" wrap="square" lIns="173375" tIns="173375" rIns="173375" bIns="173375" anchor="t" anchorCtr="0">
+            <a:noAutofit/>
+          </a:bodyPr>
+          <a:lstStyle/>
+          <a:p>
+            <a:pPr marL="0" lvl="0" indent="0" algn="l" rtl="0">
+              <a:spcBef>
+                <a:spcPts val="0"/>
+              </a:spcBef>
+              <a:spcAft>
+                <a:spcPts val="0"/>
+              </a:spcAft>
+              <a:buNone/>
+            </a:pPr>
+            <a:r>
+              <a:rPr lang="en-US"/>
+              <a:t>We have been taught to use words like “aggressive” or “competitive” to describe men, and words like “supportive” or “nurturing” to describe women. Similarly, we’re taught to react differently to </a:t>
+            </a:r>
+            <a:r>
+              <a:rPr lang="en-US" i="1"/>
+              <a:t>the exact same behavior</a:t>
+            </a:r>
+            <a:r>
+              <a:rPr lang="en-US"/>
+              <a:t> depending on who we’re reacting to. Is someone “assertive” or “overbearing”? Are they “bossy” or “a leader”?</a:t>
+            </a:r>
+            <a:endParaRPr/>
+          </a:p>
+          <a:p>
+            <a:pPr marL="0" lvl="0" indent="0" algn="l" rtl="0">
+              <a:spcBef>
+                <a:spcPts val="3000"/>
+              </a:spcBef>
+              <a:spcAft>
+                <a:spcPts val="3000"/>
+              </a:spcAft>
+              <a:buNone/>
+            </a:pPr>
+            <a:r>
+              <a:rPr lang="en-US"/>
+              <a:t>To counter this effect, ask yourself “Is how I’m describing this candidate colored by their demography?”</a:t>
+            </a:r>
+            <a:endParaRPr/>
+          </a:p>
+        </p:txBody>
+      </p:sp>
+    </p:spTree>
+    <p:extLst>
+      <p:ext uri="{BB962C8B-B14F-4D97-AF65-F5344CB8AC3E}">
+        <p14:creationId xmlns:p14="http://schemas.microsoft.com/office/powerpoint/2010/main" val="1503583098"/>
+      </p:ext>
+    </p:extLst>
+  </p:cSld>
+  <p:clrMapOvr>
+    <a:masterClrMapping/>
+  </p:clrMapOvr>
+</p:sld>
+</file>
+
+<file path=ppt/slides/slide28.xml><?xml version="1.0" encoding="utf-8"?>
+<p:sld xmlns:a="http://schemas.openxmlformats.org/drawingml/2006/main" xmlns:r="http://schemas.openxmlformats.org/officeDocument/2006/relationships" xmlns:p="http://schemas.openxmlformats.org/presentationml/2006/main">
+  <p:cSld>
+    <p:spTree>
+      <p:nvGrpSpPr>
+        <p:cNvPr id="1" name="Shape 301"/>
+        <p:cNvGrpSpPr/>
+        <p:nvPr/>
+      </p:nvGrpSpPr>
+      <p:grpSpPr>
+        <a:xfrm>
+          <a:off x="0" y="0"/>
+          <a:ext cx="0" cy="0"/>
+          <a:chOff x="0" y="0"/>
+          <a:chExt cx="0" cy="0"/>
+        </a:xfrm>
+      </p:grpSpPr>
+      <p:sp>
+        <p:nvSpPr>
+          <p:cNvPr id="302" name="Google Shape;302;p54"/>
+          <p:cNvSpPr txBox="1">
+            <a:spLocks noGrp="1"/>
+          </p:cNvSpPr>
+          <p:nvPr>
+            <p:ph type="title"/>
+          </p:nvPr>
+        </p:nvSpPr>
+        <p:spPr/>
+        <p:txBody>
+          <a:bodyPr/>
+          <a:lstStyle/>
+          <a:p>
+            <a:pPr lvl="0"/>
+            <a:r>
+              <a:rPr lang="en-US" dirty="0"/>
+              <a:t>Resume Review </a:t>
+            </a:r>
+            <a:r>
+              <a:rPr lang="en-US" b="0" dirty="0"/>
+              <a:t>Practice Session</a:t>
+            </a:r>
+            <a:br>
+              <a:rPr lang="en-US" b="0" dirty="0"/>
+            </a:br>
+            <a:r>
+              <a:rPr lang="en-US" b="0" dirty="0"/>
+              <a:t/>
+            </a:r>
+            <a:br>
+              <a:rPr lang="en-US" b="0" dirty="0"/>
+            </a:br>
+            <a:r>
+              <a:rPr lang="en-US" sz="9602" dirty="0"/>
+              <a:t>60 minutes</a:t>
+            </a:r>
+          </a:p>
+        </p:txBody>
+      </p:sp>
+    </p:spTree>
+  </p:cSld>
+  <p:clrMapOvr>
+    <a:masterClrMapping/>
+  </p:clrMapOvr>
+</p:sld>
+</file>
+
+<file path=ppt/slides/slide29.xml><?xml version="1.0" encoding="utf-8"?>
 <p:sld xmlns:a="http://schemas.openxmlformats.org/drawingml/2006/main" xmlns:r="http://schemas.openxmlformats.org/officeDocument/2006/relationships" xmlns:p="http://schemas.openxmlformats.org/presentationml/2006/main">
   <p:cSld>
     <p:spTree>
@@ -8490,59 +12505,6 @@
             <a:r>
               <a:rPr lang="en-US" dirty="0"/>
               <a:t>&lt;insert dates and SME names&gt;</a:t>
-            </a:r>
-          </a:p>
-        </p:txBody>
-      </p:sp>
-    </p:spTree>
-  </p:cSld>
-  <p:clrMapOvr>
-    <a:masterClrMapping/>
-  </p:clrMapOvr>
-</p:sld>
-</file>
-
-<file path=ppt/slides/slide21.xml><?xml version="1.0" encoding="utf-8"?>
-<p:sld xmlns:a="http://schemas.openxmlformats.org/drawingml/2006/main" xmlns:r="http://schemas.openxmlformats.org/officeDocument/2006/relationships" xmlns:p="http://schemas.openxmlformats.org/presentationml/2006/main">
-  <p:cSld>
-    <p:spTree>
-      <p:nvGrpSpPr>
-        <p:cNvPr id="1" name="Shape 307"/>
-        <p:cNvGrpSpPr/>
-        <p:nvPr/>
-      </p:nvGrpSpPr>
-      <p:grpSpPr>
-        <a:xfrm>
-          <a:off x="0" y="0"/>
-          <a:ext cx="0" cy="0"/>
-          <a:chOff x="0" y="0"/>
-          <a:chExt cx="0" cy="0"/>
-        </a:xfrm>
-      </p:grpSpPr>
-      <p:sp>
-        <p:nvSpPr>
-          <p:cNvPr id="2" name="Text Placeholder 1">
-            <a:extLst>
-              <a:ext uri="{FF2B5EF4-FFF2-40B4-BE49-F238E27FC236}">
-                <a16:creationId xmlns:a16="http://schemas.microsoft.com/office/drawing/2014/main" id="{869287C3-7579-1A46-84D5-F80BC36BAECA}"/>
-              </a:ext>
-            </a:extLst>
-          </p:cNvPr>
-          <p:cNvSpPr>
-            <a:spLocks noGrp="1"/>
-          </p:cNvSpPr>
-          <p:nvPr>
-            <p:ph type="body" idx="1"/>
-          </p:nvPr>
-        </p:nvSpPr>
-        <p:spPr/>
-        <p:txBody>
-          <a:bodyPr/>
-          <a:lstStyle/>
-          <a:p>
-            <a:r>
-              <a:rPr lang="en-US" dirty="0"/>
-              <a:t>The End</a:t>
             </a:r>
           </a:p>
         </p:txBody>
@@ -8650,6 +12612,59 @@
             <a:r>
               <a:rPr lang="en-US" dirty="0"/>
               <a:t>Reminder: Turn in filled out SME Background Info Sheet</a:t>
+            </a:r>
+          </a:p>
+        </p:txBody>
+      </p:sp>
+    </p:spTree>
+  </p:cSld>
+  <p:clrMapOvr>
+    <a:masterClrMapping/>
+  </p:clrMapOvr>
+</p:sld>
+</file>
+
+<file path=ppt/slides/slide30.xml><?xml version="1.0" encoding="utf-8"?>
+<p:sld xmlns:a="http://schemas.openxmlformats.org/drawingml/2006/main" xmlns:r="http://schemas.openxmlformats.org/officeDocument/2006/relationships" xmlns:p="http://schemas.openxmlformats.org/presentationml/2006/main">
+  <p:cSld>
+    <p:spTree>
+      <p:nvGrpSpPr>
+        <p:cNvPr id="1" name="Shape 307"/>
+        <p:cNvGrpSpPr/>
+        <p:nvPr/>
+      </p:nvGrpSpPr>
+      <p:grpSpPr>
+        <a:xfrm>
+          <a:off x="0" y="0"/>
+          <a:ext cx="0" cy="0"/>
+          <a:chOff x="0" y="0"/>
+          <a:chExt cx="0" cy="0"/>
+        </a:xfrm>
+      </p:grpSpPr>
+      <p:sp>
+        <p:nvSpPr>
+          <p:cNvPr id="2" name="Text Placeholder 1">
+            <a:extLst>
+              <a:ext uri="{FF2B5EF4-FFF2-40B4-BE49-F238E27FC236}">
+                <a16:creationId xmlns:a16="http://schemas.microsoft.com/office/drawing/2014/main" id="{869287C3-7579-1A46-84D5-F80BC36BAECA}"/>
+              </a:ext>
+            </a:extLst>
+          </p:cNvPr>
+          <p:cNvSpPr>
+            <a:spLocks noGrp="1"/>
+          </p:cNvSpPr>
+          <p:nvPr>
+            <p:ph type="body" idx="1"/>
+          </p:nvPr>
+        </p:nvSpPr>
+        <p:spPr/>
+        <p:txBody>
+          <a:bodyPr/>
+          <a:lstStyle/>
+          <a:p>
+            <a:r>
+              <a:rPr lang="en-US" dirty="0"/>
+              <a:t>The End</a:t>
             </a:r>
           </a:p>
         </p:txBody>

</xml_diff>